<commit_message>
Fragen von Prof. Müller eingefügt
Fragen eingefügt und beantwortet. Nächster Schritt: Prof. Taube
</commit_message>
<xml_diff>
--- a/Disputation/Praesentation_DominikSteffen.pptx
+++ b/Disputation/Praesentation_DominikSteffen.pptx
@@ -5,7 +5,7 @@
     <p:sldMasterId id="2147483648" r:id="rId1"/>
   </p:sldMasterIdLst>
   <p:notesMasterIdLst>
-    <p:notesMasterId r:id="rId19"/>
+    <p:notesMasterId r:id="rId31"/>
   </p:notesMasterIdLst>
   <p:sldIdLst>
     <p:sldId id="256" r:id="rId2"/>
@@ -23,8 +23,20 @@
     <p:sldId id="272" r:id="rId14"/>
     <p:sldId id="265" r:id="rId15"/>
     <p:sldId id="266" r:id="rId16"/>
-    <p:sldId id="267" r:id="rId17"/>
-    <p:sldId id="268" r:id="rId18"/>
+    <p:sldId id="277" r:id="rId17"/>
+    <p:sldId id="273" r:id="rId18"/>
+    <p:sldId id="274" r:id="rId19"/>
+    <p:sldId id="275" r:id="rId20"/>
+    <p:sldId id="276" r:id="rId21"/>
+    <p:sldId id="278" r:id="rId22"/>
+    <p:sldId id="279" r:id="rId23"/>
+    <p:sldId id="281" r:id="rId24"/>
+    <p:sldId id="280" r:id="rId25"/>
+    <p:sldId id="284" r:id="rId26"/>
+    <p:sldId id="282" r:id="rId27"/>
+    <p:sldId id="283" r:id="rId28"/>
+    <p:sldId id="267" r:id="rId29"/>
+    <p:sldId id="268" r:id="rId30"/>
   </p:sldIdLst>
   <p:sldSz cx="12192000" cy="6858000"/>
   <p:notesSz cx="6858000" cy="9144000"/>
@@ -123,6 +135,11 @@
       </a:defRPr>
     </a:lvl9pPr>
   </p:defaultTextStyle>
+  <p:extLst>
+    <p:ext uri="{EFAFB233-063F-42B5-8137-9DF3F51BA10A}">
+      <p15:sldGuideLst xmlns:p15="http://schemas.microsoft.com/office/powerpoint/2012/main"/>
+    </p:ext>
+  </p:extLst>
 </p:presentation>
 </file>
 
@@ -208,7 +225,7 @@
           <a:p>
             <a:fld id="{7C160E95-576B-4A71-8EBB-932E408482CC}" type="datetimeFigureOut">
               <a:rPr lang="de-DE" smtClean="0"/>
-              <a:t>06.07.2015</a:t>
+              <a:t>07.07.2015</a:t>
             </a:fld>
             <a:endParaRPr lang="de-DE"/>
           </a:p>
@@ -609,6 +626,582 @@
           <a:lstStyle/>
           <a:p>
             <a:r>
+              <a:rPr lang="de-DE" sz="1200" kern="1200" dirty="0" smtClean="0">
+                <a:solidFill>
+                  <a:schemeClr val="tx1"/>
+                </a:solidFill>
+                <a:effectLst/>
+                <a:latin typeface="+mn-lt"/>
+                <a:ea typeface="+mn-ea"/>
+                <a:cs typeface="+mn-cs"/>
+              </a:rPr>
+              <a:t>Von einem Hintergrundprozess des Frameworks / Tools (beim Export oder Speichern des Projektes) als ein der </a:t>
+            </a:r>
+            <a:r>
+              <a:rPr lang="de-DE" sz="1200" kern="1200" dirty="0" err="1" smtClean="0">
+                <a:solidFill>
+                  <a:schemeClr val="tx1"/>
+                </a:solidFill>
+                <a:effectLst/>
+                <a:latin typeface="+mn-lt"/>
+                <a:ea typeface="+mn-ea"/>
+                <a:cs typeface="+mn-cs"/>
+              </a:rPr>
+              <a:t>GameEngine</a:t>
+            </a:r>
+            <a:r>
+              <a:rPr lang="de-DE" sz="1200" kern="1200" dirty="0" smtClean="0">
+                <a:solidFill>
+                  <a:schemeClr val="tx1"/>
+                </a:solidFill>
+                <a:effectLst/>
+                <a:latin typeface="+mn-lt"/>
+                <a:ea typeface="+mn-ea"/>
+                <a:cs typeface="+mn-cs"/>
+              </a:rPr>
+              <a:t> bekanntes binäres oder lesbares Format (z.B. </a:t>
+            </a:r>
+            <a:r>
+              <a:rPr lang="de-DE" sz="1200" kern="1200" dirty="0" err="1" smtClean="0">
+                <a:solidFill>
+                  <a:schemeClr val="tx1"/>
+                </a:solidFill>
+                <a:effectLst/>
+                <a:latin typeface="+mn-lt"/>
+                <a:ea typeface="+mn-ea"/>
+                <a:cs typeface="+mn-cs"/>
+              </a:rPr>
+              <a:t>Fusee</a:t>
+            </a:r>
+            <a:r>
+              <a:rPr lang="de-DE" sz="1200" kern="1200" dirty="0" smtClean="0">
+                <a:solidFill>
+                  <a:schemeClr val="tx1"/>
+                </a:solidFill>
+                <a:effectLst/>
+                <a:latin typeface="+mn-lt"/>
+                <a:ea typeface="+mn-ea"/>
+                <a:cs typeface="+mn-cs"/>
+              </a:rPr>
+              <a:t> .</a:t>
+            </a:r>
+            <a:r>
+              <a:rPr lang="de-DE" sz="1200" kern="1200" dirty="0" err="1" smtClean="0">
+                <a:solidFill>
+                  <a:schemeClr val="tx1"/>
+                </a:solidFill>
+                <a:effectLst/>
+                <a:latin typeface="+mn-lt"/>
+                <a:ea typeface="+mn-ea"/>
+                <a:cs typeface="+mn-cs"/>
+              </a:rPr>
+              <a:t>fus</a:t>
+            </a:r>
+            <a:r>
+              <a:rPr lang="de-DE" sz="1200" kern="1200" dirty="0" smtClean="0">
+                <a:solidFill>
+                  <a:schemeClr val="tx1"/>
+                </a:solidFill>
+                <a:effectLst/>
+                <a:latin typeface="+mn-lt"/>
+                <a:ea typeface="+mn-ea"/>
+                <a:cs typeface="+mn-cs"/>
+              </a:rPr>
+              <a:t> oder .</a:t>
+            </a:r>
+            <a:r>
+              <a:rPr lang="de-DE" sz="1200" kern="1200" dirty="0" err="1" smtClean="0">
+                <a:solidFill>
+                  <a:schemeClr val="tx1"/>
+                </a:solidFill>
+                <a:effectLst/>
+                <a:latin typeface="+mn-lt"/>
+                <a:ea typeface="+mn-ea"/>
+                <a:cs typeface="+mn-cs"/>
+              </a:rPr>
+              <a:t>fbx</a:t>
+            </a:r>
+            <a:r>
+              <a:rPr lang="de-DE" sz="1200" kern="1200" dirty="0" smtClean="0">
+                <a:solidFill>
+                  <a:schemeClr val="tx1"/>
+                </a:solidFill>
+                <a:effectLst/>
+                <a:latin typeface="+mn-lt"/>
+                <a:ea typeface="+mn-ea"/>
+                <a:cs typeface="+mn-cs"/>
+              </a:rPr>
+              <a:t>, oder per </a:t>
+            </a:r>
+            <a:r>
+              <a:rPr lang="de-DE" sz="1200" kern="1200" dirty="0" err="1" smtClean="0">
+                <a:solidFill>
+                  <a:schemeClr val="tx1"/>
+                </a:solidFill>
+                <a:effectLst/>
+                <a:latin typeface="+mn-lt"/>
+                <a:ea typeface="+mn-ea"/>
+                <a:cs typeface="+mn-cs"/>
+              </a:rPr>
+              <a:t>protocol</a:t>
+            </a:r>
+            <a:r>
+              <a:rPr lang="de-DE" sz="1200" kern="1200" dirty="0" smtClean="0">
+                <a:solidFill>
+                  <a:schemeClr val="tx1"/>
+                </a:solidFill>
+                <a:effectLst/>
+                <a:latin typeface="+mn-lt"/>
+                <a:ea typeface="+mn-ea"/>
+                <a:cs typeface="+mn-cs"/>
+              </a:rPr>
+              <a:t> </a:t>
+            </a:r>
+            <a:r>
+              <a:rPr lang="de-DE" sz="1200" kern="1200" dirty="0" err="1" smtClean="0">
+                <a:solidFill>
+                  <a:schemeClr val="tx1"/>
+                </a:solidFill>
+                <a:effectLst/>
+                <a:latin typeface="+mn-lt"/>
+                <a:ea typeface="+mn-ea"/>
+                <a:cs typeface="+mn-cs"/>
+              </a:rPr>
+              <a:t>buffers</a:t>
+            </a:r>
+            <a:r>
+              <a:rPr lang="de-DE" sz="1200" kern="1200" dirty="0" smtClean="0">
+                <a:solidFill>
+                  <a:schemeClr val="tx1"/>
+                </a:solidFill>
+                <a:effectLst/>
+                <a:latin typeface="+mn-lt"/>
+                <a:ea typeface="+mn-ea"/>
+                <a:cs typeface="+mn-cs"/>
+              </a:rPr>
+              <a:t>) exportieren. Hierbei eine Klasse / ein Konstrukt (</a:t>
+            </a:r>
+            <a:r>
+              <a:rPr lang="de-DE" sz="1200" kern="1200" dirty="0" err="1" smtClean="0">
+                <a:solidFill>
+                  <a:schemeClr val="tx1"/>
+                </a:solidFill>
+                <a:effectLst/>
+                <a:latin typeface="+mn-lt"/>
+                <a:ea typeface="+mn-ea"/>
+                <a:cs typeface="+mn-cs"/>
+              </a:rPr>
+              <a:t>Struct</a:t>
+            </a:r>
+            <a:r>
+              <a:rPr lang="de-DE" sz="1200" kern="1200" dirty="0" smtClean="0">
+                <a:solidFill>
+                  <a:schemeClr val="tx1"/>
+                </a:solidFill>
+                <a:effectLst/>
+                <a:latin typeface="+mn-lt"/>
+                <a:ea typeface="+mn-ea"/>
+                <a:cs typeface="+mn-cs"/>
+              </a:rPr>
+              <a:t>) mit einem spezifischen Namen / ID anlegen. Dieses Konstrukt enthält eine Verbindung zu den Daten (Pfade) des exportierten „</a:t>
+            </a:r>
+            <a:r>
+              <a:rPr lang="de-DE" sz="1200" kern="1200" dirty="0" err="1" smtClean="0">
+                <a:solidFill>
+                  <a:schemeClr val="tx1"/>
+                </a:solidFill>
+                <a:effectLst/>
+                <a:latin typeface="+mn-lt"/>
+                <a:ea typeface="+mn-ea"/>
+                <a:cs typeface="+mn-cs"/>
+              </a:rPr>
+              <a:t>Deliverable</a:t>
+            </a:r>
+            <a:r>
+              <a:rPr lang="de-DE" sz="1200" kern="1200" dirty="0" smtClean="0">
+                <a:solidFill>
+                  <a:schemeClr val="tx1"/>
+                </a:solidFill>
+                <a:effectLst/>
+                <a:latin typeface="+mn-lt"/>
+                <a:ea typeface="+mn-ea"/>
+                <a:cs typeface="+mn-cs"/>
+              </a:rPr>
+              <a:t>“ Objektes (</a:t>
+            </a:r>
+            <a:r>
+              <a:rPr lang="de-DE" sz="1200" kern="1200" dirty="0" err="1" smtClean="0">
+                <a:solidFill>
+                  <a:schemeClr val="tx1"/>
+                </a:solidFill>
+                <a:effectLst/>
+                <a:latin typeface="+mn-lt"/>
+                <a:ea typeface="+mn-ea"/>
+                <a:cs typeface="+mn-cs"/>
+              </a:rPr>
+              <a:t>Component</a:t>
+            </a:r>
+            <a:r>
+              <a:rPr lang="de-DE" sz="1200" kern="1200" dirty="0" smtClean="0">
+                <a:solidFill>
+                  <a:schemeClr val="tx1"/>
+                </a:solidFill>
+                <a:effectLst/>
+                <a:latin typeface="+mn-lt"/>
+                <a:ea typeface="+mn-ea"/>
+                <a:cs typeface="+mn-cs"/>
+              </a:rPr>
+              <a:t> basiertes System). Es enthält außerdem wenn nötig Prüfsummen (für Prüfung durch das Framework) zur Integrität des Objektes.</a:t>
+            </a:r>
+          </a:p>
+          <a:p>
+            <a:r>
+              <a:rPr lang="de-DE" sz="1200" kern="1200" dirty="0" smtClean="0">
+                <a:solidFill>
+                  <a:schemeClr val="tx1"/>
+                </a:solidFill>
+                <a:effectLst/>
+                <a:latin typeface="+mn-lt"/>
+                <a:ea typeface="+mn-ea"/>
+                <a:cs typeface="+mn-cs"/>
+              </a:rPr>
+              <a:t>Der </a:t>
+            </a:r>
+            <a:r>
+              <a:rPr lang="de-DE" sz="1200" kern="1200" dirty="0" err="1" smtClean="0">
+                <a:solidFill>
+                  <a:schemeClr val="tx1"/>
+                </a:solidFill>
+                <a:effectLst/>
+                <a:latin typeface="+mn-lt"/>
+                <a:ea typeface="+mn-ea"/>
+                <a:cs typeface="+mn-cs"/>
+              </a:rPr>
+              <a:t>Basistyp</a:t>
+            </a:r>
+            <a:r>
+              <a:rPr lang="de-DE" sz="1200" kern="1200" dirty="0" smtClean="0">
+                <a:solidFill>
+                  <a:schemeClr val="tx1"/>
+                </a:solidFill>
+                <a:effectLst/>
+                <a:latin typeface="+mn-lt"/>
+                <a:ea typeface="+mn-ea"/>
+                <a:cs typeface="+mn-cs"/>
+              </a:rPr>
+              <a:t> der Konstrukt-Klasse könnte von einer Engine eigenen „</a:t>
+            </a:r>
+            <a:r>
+              <a:rPr lang="de-DE" sz="1200" kern="1200" dirty="0" err="1" smtClean="0">
+                <a:solidFill>
+                  <a:schemeClr val="tx1"/>
+                </a:solidFill>
+                <a:effectLst/>
+                <a:latin typeface="+mn-lt"/>
+                <a:ea typeface="+mn-ea"/>
+                <a:cs typeface="+mn-cs"/>
+              </a:rPr>
+              <a:t>Object</a:t>
+            </a:r>
+            <a:r>
+              <a:rPr lang="de-DE" sz="1200" kern="1200" dirty="0" smtClean="0">
+                <a:solidFill>
+                  <a:schemeClr val="tx1"/>
+                </a:solidFill>
+                <a:effectLst/>
+                <a:latin typeface="+mn-lt"/>
+                <a:ea typeface="+mn-ea"/>
+                <a:cs typeface="+mn-cs"/>
+              </a:rPr>
+              <a:t>“ (generischer </a:t>
+            </a:r>
+            <a:r>
+              <a:rPr lang="de-DE" sz="1200" kern="1200" dirty="0" err="1" smtClean="0">
+                <a:solidFill>
+                  <a:schemeClr val="tx1"/>
+                </a:solidFill>
+                <a:effectLst/>
+                <a:latin typeface="+mn-lt"/>
+                <a:ea typeface="+mn-ea"/>
+                <a:cs typeface="+mn-cs"/>
+              </a:rPr>
+              <a:t>Assettyp</a:t>
+            </a:r>
+            <a:r>
+              <a:rPr lang="de-DE" sz="1200" kern="1200" dirty="0" smtClean="0">
+                <a:solidFill>
+                  <a:schemeClr val="tx1"/>
+                </a:solidFill>
+                <a:effectLst/>
+                <a:latin typeface="+mn-lt"/>
+                <a:ea typeface="+mn-ea"/>
+                <a:cs typeface="+mn-cs"/>
+              </a:rPr>
+              <a:t> für Engine Objekte / 3D Objekte etc.) Klasse abgeleitet sein.</a:t>
+            </a:r>
+          </a:p>
+          <a:p>
+            <a:r>
+              <a:rPr lang="de-DE" sz="1200" kern="1200" dirty="0" smtClean="0">
+                <a:solidFill>
+                  <a:schemeClr val="tx1"/>
+                </a:solidFill>
+                <a:effectLst/>
+                <a:latin typeface="+mn-lt"/>
+                <a:ea typeface="+mn-ea"/>
+                <a:cs typeface="+mn-cs"/>
+              </a:rPr>
+              <a:t>Das Objekt könnte als „Partial Class“ (mehrfach aufgeteilte Klassen zur Repräsentation eines Objekts, physikalisch separierte Dateien, nicht vom Compiler beachtet sondern eher für den Nutzer gedacht) repräsentiert werden. Somit würde der Entwickler ein „sauberes“ Objekt enthalten, während die nötigen Daten im zweiten Teil der „Partial Class“ stecken. Dieser wird  jedoch nur vom Framework kontrolliert und nicht durch den Programmierer bearbeitet. Natürlich müsste das Framework prüfen, ob das Objekt so schon vorhanden ist. Hierzu gleich noch eine Anmerkung.</a:t>
+            </a:r>
+          </a:p>
+          <a:p>
+            <a:r>
+              <a:rPr lang="de-DE" sz="1200" kern="1200" dirty="0" smtClean="0">
+                <a:solidFill>
+                  <a:schemeClr val="tx1"/>
+                </a:solidFill>
+                <a:effectLst/>
+                <a:latin typeface="+mn-lt"/>
+                <a:ea typeface="+mn-ea"/>
+                <a:cs typeface="+mn-cs"/>
+              </a:rPr>
+              <a:t>Für das Toolkit / Framework an sich benötigt es noch ein Informationsfile welches alle nötigen Pfade und wichtige Parameter sammelt, damit das Projekt im 3D Editor wieder rekonstruiert werden kann. Hierzu ist im System Design von </a:t>
+            </a:r>
+            <a:r>
+              <a:rPr lang="de-DE" sz="1200" kern="1200" dirty="0" err="1" smtClean="0">
+                <a:solidFill>
+                  <a:schemeClr val="tx1"/>
+                </a:solidFill>
+                <a:effectLst/>
+                <a:latin typeface="+mn-lt"/>
+                <a:ea typeface="+mn-ea"/>
+                <a:cs typeface="+mn-cs"/>
+              </a:rPr>
+              <a:t>FuseeAT</a:t>
+            </a:r>
+            <a:r>
+              <a:rPr lang="de-DE" sz="1200" kern="1200" dirty="0" smtClean="0">
+                <a:solidFill>
+                  <a:schemeClr val="tx1"/>
+                </a:solidFill>
+                <a:effectLst/>
+                <a:latin typeface="+mn-lt"/>
+                <a:ea typeface="+mn-ea"/>
+                <a:cs typeface="+mn-cs"/>
+              </a:rPr>
+              <a:t> das Konstrukt „</a:t>
+            </a:r>
+            <a:r>
+              <a:rPr lang="de-DE" sz="1200" kern="1200" dirty="0" err="1" smtClean="0">
+                <a:solidFill>
+                  <a:schemeClr val="tx1"/>
+                </a:solidFill>
+                <a:effectLst/>
+                <a:latin typeface="+mn-lt"/>
+                <a:ea typeface="+mn-ea"/>
+                <a:cs typeface="+mn-cs"/>
+              </a:rPr>
+              <a:t>struct</a:t>
+            </a:r>
+            <a:r>
+              <a:rPr lang="de-DE" sz="1200" kern="1200" dirty="0" smtClean="0">
+                <a:solidFill>
+                  <a:schemeClr val="tx1"/>
+                </a:solidFill>
+                <a:effectLst/>
+                <a:latin typeface="+mn-lt"/>
+                <a:ea typeface="+mn-ea"/>
+                <a:cs typeface="+mn-cs"/>
+              </a:rPr>
+              <a:t> </a:t>
+            </a:r>
+            <a:r>
+              <a:rPr lang="de-DE" sz="1200" kern="1200" dirty="0" err="1" smtClean="0">
+                <a:solidFill>
+                  <a:schemeClr val="tx1"/>
+                </a:solidFill>
+                <a:effectLst/>
+                <a:latin typeface="+mn-lt"/>
+                <a:ea typeface="+mn-ea"/>
+                <a:cs typeface="+mn-cs"/>
+              </a:rPr>
+              <a:t>ACRelationData</a:t>
+            </a:r>
+            <a:r>
+              <a:rPr lang="de-DE" sz="1200" kern="1200" dirty="0" smtClean="0">
+                <a:solidFill>
+                  <a:schemeClr val="tx1"/>
+                </a:solidFill>
+                <a:effectLst/>
+                <a:latin typeface="+mn-lt"/>
+                <a:ea typeface="+mn-ea"/>
+                <a:cs typeface="+mn-cs"/>
+              </a:rPr>
+              <a:t>“ vorgesehen. Es speichert die erwähnten Parameter über eine Asset Code Beziehung und wird anschließend als XML File </a:t>
+            </a:r>
+            <a:r>
+              <a:rPr lang="de-DE" sz="1200" kern="1200" dirty="0" err="1" smtClean="0">
+                <a:solidFill>
+                  <a:schemeClr val="tx1"/>
+                </a:solidFill>
+                <a:effectLst/>
+                <a:latin typeface="+mn-lt"/>
+                <a:ea typeface="+mn-ea"/>
+                <a:cs typeface="+mn-cs"/>
+              </a:rPr>
+              <a:t>serialisiert</a:t>
+            </a:r>
+            <a:r>
+              <a:rPr lang="de-DE" sz="1200" kern="1200" dirty="0" smtClean="0">
+                <a:solidFill>
+                  <a:schemeClr val="tx1"/>
+                </a:solidFill>
+                <a:effectLst/>
+                <a:latin typeface="+mn-lt"/>
+                <a:ea typeface="+mn-ea"/>
+                <a:cs typeface="+mn-cs"/>
+              </a:rPr>
+              <a:t>. Es wird benötigt, sollte ein Projekt im 3D Editor geöffnet werden um im Speichert die Beziehungen zuzuordnen.</a:t>
+            </a:r>
+          </a:p>
+          <a:p>
+            <a:r>
+              <a:rPr lang="de-DE" sz="1200" kern="1200" dirty="0" smtClean="0">
+                <a:solidFill>
+                  <a:schemeClr val="tx1"/>
+                </a:solidFill>
+                <a:effectLst/>
+                <a:latin typeface="+mn-lt"/>
+                <a:ea typeface="+mn-ea"/>
+                <a:cs typeface="+mn-cs"/>
+              </a:rPr>
+              <a:t>Der Programmierer kann nun im Code Objekte des gewünschten Typs instanziieren bzw. sie in ein Szene </a:t>
+            </a:r>
+            <a:r>
+              <a:rPr lang="de-DE" sz="1200" kern="1200" dirty="0" err="1" smtClean="0">
+                <a:solidFill>
+                  <a:schemeClr val="tx1"/>
+                </a:solidFill>
+                <a:effectLst/>
+                <a:latin typeface="+mn-lt"/>
+                <a:ea typeface="+mn-ea"/>
+                <a:cs typeface="+mn-cs"/>
+              </a:rPr>
+              <a:t>Node</a:t>
+            </a:r>
+            <a:r>
+              <a:rPr lang="de-DE" sz="1200" kern="1200" dirty="0" smtClean="0">
+                <a:solidFill>
+                  <a:schemeClr val="tx1"/>
+                </a:solidFill>
+                <a:effectLst/>
+                <a:latin typeface="+mn-lt"/>
+                <a:ea typeface="+mn-ea"/>
+                <a:cs typeface="+mn-cs"/>
+              </a:rPr>
+              <a:t> System integrieren.</a:t>
+            </a:r>
+          </a:p>
+          <a:p>
+            <a:r>
+              <a:rPr lang="de-DE" sz="1200" kern="1200" dirty="0" smtClean="0">
+                <a:solidFill>
+                  <a:schemeClr val="tx1"/>
+                </a:solidFill>
+                <a:effectLst/>
+                <a:latin typeface="+mn-lt"/>
+                <a:ea typeface="+mn-ea"/>
+                <a:cs typeface="+mn-cs"/>
+              </a:rPr>
+              <a:t>Der Vorteil ist, Informationen die von einem Code Generator stammen (in diesem Fall das Toolkit / Framework) verändern nicht den Code der  während der Entwicklung vom Programmierer geschrieben wurde.</a:t>
+            </a:r>
+          </a:p>
+          <a:p>
+            <a:endParaRPr lang="de-DE" dirty="0"/>
+          </a:p>
+        </p:txBody>
+      </p:sp>
+      <p:sp>
+        <p:nvSpPr>
+          <p:cNvPr id="4" name="Foliennummernplatzhalter 3"/>
+          <p:cNvSpPr>
+            <a:spLocks noGrp="1"/>
+          </p:cNvSpPr>
+          <p:nvPr>
+            <p:ph type="sldNum" sz="quarter" idx="10"/>
+          </p:nvPr>
+        </p:nvSpPr>
+        <p:spPr/>
+        <p:txBody>
+          <a:bodyPr/>
+          <a:lstStyle/>
+          <a:p>
+            <a:fld id="{B31920E4-02A0-409B-A8B9-098E88402350}" type="slidenum">
+              <a:rPr lang="de-DE" smtClean="0"/>
+              <a:t>15</a:t>
+            </a:fld>
+            <a:endParaRPr lang="de-DE"/>
+          </a:p>
+        </p:txBody>
+      </p:sp>
+    </p:spTree>
+    <p:extLst>
+      <p:ext uri="{BB962C8B-B14F-4D97-AF65-F5344CB8AC3E}">
+        <p14:creationId xmlns:p14="http://schemas.microsoft.com/office/powerpoint/2010/main" val="2809768598"/>
+      </p:ext>
+    </p:extLst>
+  </p:cSld>
+  <p:clrMapOvr>
+    <a:masterClrMapping/>
+  </p:clrMapOvr>
+</p:notes>
+</file>
+
+<file path=ppt/notesSlides/notesSlide3.xml><?xml version="1.0" encoding="utf-8"?>
+<p:notes xmlns:a="http://schemas.openxmlformats.org/drawingml/2006/main" xmlns:r="http://schemas.openxmlformats.org/officeDocument/2006/relationships" xmlns:p="http://schemas.openxmlformats.org/presentationml/2006/main">
+  <p:cSld>
+    <p:spTree>
+      <p:nvGrpSpPr>
+        <p:cNvPr id="1" name=""/>
+        <p:cNvGrpSpPr/>
+        <p:nvPr/>
+      </p:nvGrpSpPr>
+      <p:grpSpPr>
+        <a:xfrm>
+          <a:off x="0" y="0"/>
+          <a:ext cx="0" cy="0"/>
+          <a:chOff x="0" y="0"/>
+          <a:chExt cx="0" cy="0"/>
+        </a:xfrm>
+      </p:grpSpPr>
+      <p:sp>
+        <p:nvSpPr>
+          <p:cNvPr id="2" name="Folienbildplatzhalter 1"/>
+          <p:cNvSpPr>
+            <a:spLocks noGrp="1" noRot="1" noChangeAspect="1"/>
+          </p:cNvSpPr>
+          <p:nvPr>
+            <p:ph type="sldImg"/>
+          </p:nvPr>
+        </p:nvSpPr>
+        <p:spPr/>
+      </p:sp>
+      <p:sp>
+        <p:nvSpPr>
+          <p:cNvPr id="3" name="Notizenplatzhalter 2"/>
+          <p:cNvSpPr>
+            <a:spLocks noGrp="1"/>
+          </p:cNvSpPr>
+          <p:nvPr>
+            <p:ph type="body" idx="1"/>
+          </p:nvPr>
+        </p:nvSpPr>
+        <p:spPr/>
+        <p:txBody>
+          <a:bodyPr/>
+          <a:lstStyle/>
+          <a:p>
+            <a:r>
               <a:rPr lang="de-DE" dirty="0" smtClean="0"/>
               <a:t>Hier noch </a:t>
             </a:r>
@@ -645,7 +1238,7 @@
           <a:p>
             <a:fld id="{B31920E4-02A0-409B-A8B9-098E88402350}" type="slidenum">
               <a:rPr lang="de-DE" smtClean="0"/>
-              <a:t>17</a:t>
+              <a:t>29</a:t>
             </a:fld>
             <a:endParaRPr lang="de-DE"/>
           </a:p>
@@ -850,7 +1443,7 @@
           <a:p>
             <a:fld id="{4AAD347D-5ACD-4C99-B74B-A9C85AD731AF}" type="datetimeFigureOut">
               <a:rPr lang="en-US" dirty="0"/>
-              <a:t>7/6/2015</a:t>
+              <a:t>7/7/2015</a:t>
             </a:fld>
             <a:endParaRPr lang="en-US" dirty="0"/>
           </a:p>
@@ -1120,7 +1713,7 @@
           <a:p>
             <a:fld id="{4509A250-FF31-4206-8172-F9D3106AACB1}" type="datetimeFigureOut">
               <a:rPr lang="en-US" dirty="0"/>
-              <a:t>7/6/2015</a:t>
+              <a:t>7/7/2015</a:t>
             </a:fld>
             <a:endParaRPr lang="en-US" dirty="0"/>
           </a:p>
@@ -1309,7 +1902,7 @@
           <a:p>
             <a:fld id="{4509A250-FF31-4206-8172-F9D3106AACB1}" type="datetimeFigureOut">
               <a:rPr lang="en-US" dirty="0"/>
-              <a:t>7/6/2015</a:t>
+              <a:t>7/7/2015</a:t>
             </a:fld>
             <a:endParaRPr lang="en-US" dirty="0"/>
           </a:p>
@@ -1577,7 +2170,7 @@
           <a:p>
             <a:fld id="{4509A250-FF31-4206-8172-F9D3106AACB1}" type="datetimeFigureOut">
               <a:rPr lang="en-US" dirty="0"/>
-              <a:t>7/6/2015</a:t>
+              <a:t>7/7/2015</a:t>
             </a:fld>
             <a:endParaRPr lang="en-US" dirty="0"/>
           </a:p>
@@ -1913,7 +2506,7 @@
           <a:p>
             <a:fld id="{4509A250-FF31-4206-8172-F9D3106AACB1}" type="datetimeFigureOut">
               <a:rPr lang="en-US" dirty="0"/>
-              <a:t>7/6/2015</a:t>
+              <a:t>7/7/2015</a:t>
             </a:fld>
             <a:endParaRPr lang="en-US" dirty="0"/>
           </a:p>
@@ -2531,7 +3124,7 @@
           <a:p>
             <a:fld id="{4509A250-FF31-4206-8172-F9D3106AACB1}" type="datetimeFigureOut">
               <a:rPr lang="en-US" dirty="0"/>
-              <a:t>7/6/2015</a:t>
+              <a:t>7/7/2015</a:t>
             </a:fld>
             <a:endParaRPr lang="en-US" dirty="0"/>
           </a:p>
@@ -3386,7 +3979,7 @@
           <a:p>
             <a:fld id="{4509A250-FF31-4206-8172-F9D3106AACB1}" type="datetimeFigureOut">
               <a:rPr lang="en-US" dirty="0"/>
-              <a:t>7/6/2015</a:t>
+              <a:t>7/7/2015</a:t>
             </a:fld>
             <a:endParaRPr lang="en-US" dirty="0"/>
           </a:p>
@@ -3551,7 +4144,7 @@
           <a:p>
             <a:fld id="{4509A250-FF31-4206-8172-F9D3106AACB1}" type="datetimeFigureOut">
               <a:rPr lang="en-US" dirty="0"/>
-              <a:t>7/6/2015</a:t>
+              <a:t>7/7/2015</a:t>
             </a:fld>
             <a:endParaRPr lang="en-US" dirty="0"/>
           </a:p>
@@ -3726,7 +4319,7 @@
           <a:p>
             <a:fld id="{4509A250-FF31-4206-8172-F9D3106AACB1}" type="datetimeFigureOut">
               <a:rPr lang="en-US" dirty="0"/>
-              <a:t>7/6/2015</a:t>
+              <a:t>7/7/2015</a:t>
             </a:fld>
             <a:endParaRPr lang="en-US" dirty="0"/>
           </a:p>
@@ -3891,7 +4484,7 @@
           <a:p>
             <a:fld id="{4509A250-FF31-4206-8172-F9D3106AACB1}" type="datetimeFigureOut">
               <a:rPr lang="en-US" dirty="0"/>
-              <a:t>7/6/2015</a:t>
+              <a:t>7/7/2015</a:t>
             </a:fld>
             <a:endParaRPr lang="en-US" dirty="0"/>
           </a:p>
@@ -4133,7 +4726,7 @@
           <a:p>
             <a:fld id="{9796027F-7875-4030-9381-8BD8C4F21935}" type="datetimeFigureOut">
               <a:rPr lang="en-US" dirty="0"/>
-              <a:t>7/6/2015</a:t>
+              <a:t>7/7/2015</a:t>
             </a:fld>
             <a:endParaRPr lang="en-US" dirty="0"/>
           </a:p>
@@ -4420,7 +5013,7 @@
           <a:p>
             <a:fld id="{9796027F-7875-4030-9381-8BD8C4F21935}" type="datetimeFigureOut">
               <a:rPr lang="en-US" dirty="0"/>
-              <a:t>7/6/2015</a:t>
+              <a:t>7/7/2015</a:t>
             </a:fld>
             <a:endParaRPr lang="en-US" dirty="0"/>
           </a:p>
@@ -4859,7 +5452,7 @@
           <a:p>
             <a:fld id="{9796027F-7875-4030-9381-8BD8C4F21935}" type="datetimeFigureOut">
               <a:rPr lang="en-US" dirty="0"/>
-              <a:t>7/6/2015</a:t>
+              <a:t>7/7/2015</a:t>
             </a:fld>
             <a:endParaRPr lang="en-US" dirty="0"/>
           </a:p>
@@ -4972,7 +5565,7 @@
           <a:p>
             <a:fld id="{4509A250-FF31-4206-8172-F9D3106AACB1}" type="datetimeFigureOut">
               <a:rPr lang="en-US" dirty="0"/>
-              <a:t>7/6/2015</a:t>
+              <a:t>7/7/2015</a:t>
             </a:fld>
             <a:endParaRPr lang="en-US" dirty="0"/>
           </a:p>
@@ -5062,7 +5655,7 @@
           <a:p>
             <a:fld id="{4509A250-FF31-4206-8172-F9D3106AACB1}" type="datetimeFigureOut">
               <a:rPr lang="en-US" dirty="0"/>
-              <a:t>7/6/2015</a:t>
+              <a:t>7/7/2015</a:t>
             </a:fld>
             <a:endParaRPr lang="en-US" dirty="0"/>
           </a:p>
@@ -5336,7 +5929,7 @@
           <a:p>
             <a:fld id="{4509A250-FF31-4206-8172-F9D3106AACB1}" type="datetimeFigureOut">
               <a:rPr lang="en-US" dirty="0"/>
-              <a:t>7/6/2015</a:t>
+              <a:t>7/7/2015</a:t>
             </a:fld>
             <a:endParaRPr lang="en-US" dirty="0"/>
           </a:p>
@@ -5606,7 +6199,7 @@
           <a:p>
             <a:fld id="{4509A250-FF31-4206-8172-F9D3106AACB1}" type="datetimeFigureOut">
               <a:rPr lang="en-US" dirty="0"/>
-              <a:t>7/6/2015</a:t>
+              <a:t>7/7/2015</a:t>
             </a:fld>
             <a:endParaRPr lang="en-US" dirty="0"/>
           </a:p>
@@ -5994,7 +6587,7 @@
           <a:p>
             <a:fld id="{4AAD347D-5ACD-4C99-B74B-A9C85AD731AF}" type="datetimeFigureOut">
               <a:rPr lang="en-US" dirty="0"/>
-              <a:t>7/6/2015</a:t>
+              <a:t>7/7/2015</a:t>
             </a:fld>
             <a:endParaRPr lang="en-US" dirty="0"/>
           </a:p>
@@ -7303,9 +7896,21 @@
           <a:p>
             <a:r>
               <a:rPr lang="de-DE" dirty="0" smtClean="0"/>
-              <a:t>Fragen Block A (Prof. Taube)</a:t>
-            </a:r>
-            <a:endParaRPr lang="de-DE" dirty="0"/>
+              <a:t>Fragen Block A </a:t>
+            </a:r>
+            <a:r>
+              <a:rPr lang="de-DE" sz="2000" i="1" dirty="0" smtClean="0"/>
+              <a:t>(Prof. </a:t>
+            </a:r>
+            <a:r>
+              <a:rPr lang="de-DE" sz="2000" i="1" dirty="0" smtClean="0"/>
+              <a:t>Dr. W. Taube</a:t>
+            </a:r>
+            <a:r>
+              <a:rPr lang="de-DE" sz="2000" i="1" dirty="0" smtClean="0"/>
+              <a:t>)</a:t>
+            </a:r>
+            <a:endParaRPr lang="de-DE" sz="2000" i="1" dirty="0"/>
           </a:p>
         </p:txBody>
       </p:sp>
@@ -7382,9 +7987,33 @@
           <a:p>
             <a:r>
               <a:rPr lang="de-DE" dirty="0" smtClean="0"/>
-              <a:t>Fragen Block B (Prof. Müller)</a:t>
-            </a:r>
-            <a:endParaRPr lang="de-DE" dirty="0"/>
+              <a:t>Fragen Block B</a:t>
+            </a:r>
+            <a:r>
+              <a:rPr lang="de-DE" dirty="0" smtClean="0"/>
+              <a:t> </a:t>
+            </a:r>
+            <a:r>
+              <a:rPr lang="de-DE" sz="2000" i="1" dirty="0" smtClean="0"/>
+              <a:t>(</a:t>
+            </a:r>
+            <a:r>
+              <a:rPr lang="de-DE" sz="2000" i="1" dirty="0" smtClean="0"/>
+              <a:t>Prof</a:t>
+            </a:r>
+            <a:r>
+              <a:rPr lang="de-DE" sz="2000" i="1" dirty="0" smtClean="0"/>
+              <a:t>. </a:t>
+            </a:r>
+            <a:r>
+              <a:rPr lang="de-DE" sz="2000" i="1" dirty="0" smtClean="0"/>
+              <a:t>C. Müller</a:t>
+            </a:r>
+            <a:r>
+              <a:rPr lang="de-DE" sz="2000" i="1" dirty="0" smtClean="0"/>
+              <a:t>)</a:t>
+            </a:r>
+            <a:endParaRPr lang="de-DE" sz="2000" i="1" dirty="0"/>
           </a:p>
         </p:txBody>
       </p:sp>
@@ -7400,10 +8029,32 @@
         </p:nvSpPr>
         <p:spPr/>
         <p:txBody>
-          <a:bodyPr/>
-          <a:lstStyle/>
-          <a:p>
-            <a:endParaRPr lang="de-DE"/>
+          <a:bodyPr>
+            <a:normAutofit/>
+          </a:bodyPr>
+          <a:lstStyle/>
+          <a:p>
+            <a:pPr lvl="0"/>
+            <a:r>
+              <a:rPr lang="de-DE" sz="2400" b="1" dirty="0" smtClean="0"/>
+              <a:t>F1: Welche </a:t>
+            </a:r>
+            <a:r>
+              <a:rPr lang="de-DE" sz="2400" b="1" dirty="0"/>
+              <a:t>Möglichkeiten gibt es, von 3D-Modellierern erzeugte „</a:t>
+            </a:r>
+            <a:r>
+              <a:rPr lang="de-DE" sz="2400" b="1" dirty="0" err="1"/>
+              <a:t>Deliverables</a:t>
+            </a:r>
+            <a:r>
+              <a:rPr lang="de-DE" sz="2400" b="1" dirty="0"/>
+              <a:t>“ (3D-Objekte, 3D-Objekt-Bestandteile, -Eigenschaften) automatisiert als geeignete programmiersprachliche Konstrukte (Klassen/Objekte/Eigenschaften) zu repräsentieren, so dass Programmierer darauf Zugriff haben</a:t>
+            </a:r>
+            <a:r>
+              <a:rPr lang="de-DE" sz="2400" b="1" dirty="0" smtClean="0"/>
+              <a:t>?</a:t>
+            </a:r>
           </a:p>
         </p:txBody>
       </p:sp>
@@ -7460,8 +8111,20 @@
           <a:lstStyle/>
           <a:p>
             <a:r>
-              <a:rPr lang="de-DE" dirty="0" smtClean="0"/>
-              <a:t>Abschluss</a:t>
+              <a:rPr lang="de-DE" dirty="0">
+                <a:solidFill>
+                  <a:srgbClr val="EBEBEB"/>
+                </a:solidFill>
+              </a:rPr>
+              <a:t>Fragen Block B </a:t>
+            </a:r>
+            <a:r>
+              <a:rPr lang="de-DE" sz="2000" i="1" dirty="0">
+                <a:solidFill>
+                  <a:srgbClr val="EBEBEB"/>
+                </a:solidFill>
+              </a:rPr>
+              <a:t>(Prof. C. Müller)</a:t>
             </a:r>
             <a:endParaRPr lang="de-DE" dirty="0"/>
           </a:p>
@@ -7469,30 +8132,243 @@
       </p:sp>
       <p:sp>
         <p:nvSpPr>
-          <p:cNvPr id="3" name="Inhaltsplatzhalter 2"/>
-          <p:cNvSpPr>
-            <a:spLocks noGrp="1"/>
-          </p:cNvSpPr>
-          <p:nvPr>
-            <p:ph idx="1"/>
-          </p:nvPr>
-        </p:nvSpPr>
-        <p:spPr/>
-        <p:txBody>
-          <a:bodyPr/>
-          <a:lstStyle/>
-          <a:p>
-            <a:r>
-              <a:rPr lang="de-DE" dirty="0" smtClean="0"/>
-              <a:t>Fragen und Diskussion des Auditoriums.</a:t>
-            </a:r>
+          <p:cNvPr id="4" name="Abgerundetes Rechteck 3"/>
+          <p:cNvSpPr/>
+          <p:nvPr/>
+        </p:nvSpPr>
+        <p:spPr>
+          <a:xfrm>
+            <a:off x="1498166" y="3158836"/>
+            <a:ext cx="1847707" cy="1018309"/>
+          </a:xfrm>
+          <a:prstGeom prst="roundRect">
+            <a:avLst/>
+          </a:prstGeom>
+          <a:ln>
+            <a:noFill/>
+          </a:ln>
+        </p:spPr>
+        <p:style>
+          <a:lnRef idx="2">
+            <a:schemeClr val="accent6"/>
+          </a:lnRef>
+          <a:fillRef idx="1001">
+            <a:schemeClr val="lt1"/>
+          </a:fillRef>
+          <a:effectRef idx="0">
+            <a:schemeClr val="accent6"/>
+          </a:effectRef>
+          <a:fontRef idx="minor">
+            <a:schemeClr val="dk1"/>
+          </a:fontRef>
+        </p:style>
+        <p:txBody>
+          <a:bodyPr rtlCol="0" anchor="ctr"/>
+          <a:lstStyle/>
+          <a:p>
+            <a:pPr algn="ctr"/>
+            <a:r>
+              <a:rPr lang="de-DE" b="1" dirty="0" smtClean="0"/>
+              <a:t>Trigger </a:t>
+            </a:r>
+          </a:p>
+          <a:p>
+            <a:pPr algn="ctr"/>
+            <a:r>
+              <a:rPr lang="de-DE" b="1" dirty="0" smtClean="0"/>
+              <a:t>im Editor</a:t>
+            </a:r>
+            <a:endParaRPr lang="de-DE" b="1" dirty="0"/>
+          </a:p>
+        </p:txBody>
+      </p:sp>
+      <p:sp>
+        <p:nvSpPr>
+          <p:cNvPr id="5" name="Abgerundetes Rechteck 4"/>
+          <p:cNvSpPr/>
+          <p:nvPr/>
+        </p:nvSpPr>
+        <p:spPr>
+          <a:xfrm>
+            <a:off x="5250699" y="3158835"/>
+            <a:ext cx="1847707" cy="1018309"/>
+          </a:xfrm>
+          <a:prstGeom prst="roundRect">
+            <a:avLst/>
+          </a:prstGeom>
+          <a:ln>
+            <a:noFill/>
+          </a:ln>
+        </p:spPr>
+        <p:style>
+          <a:lnRef idx="2">
+            <a:schemeClr val="accent6"/>
+          </a:lnRef>
+          <a:fillRef idx="1001">
+            <a:schemeClr val="lt1"/>
+          </a:fillRef>
+          <a:effectRef idx="0">
+            <a:schemeClr val="accent6"/>
+          </a:effectRef>
+          <a:fontRef idx="minor">
+            <a:schemeClr val="dk1"/>
+          </a:fontRef>
+        </p:style>
+        <p:txBody>
+          <a:bodyPr rtlCol="0" anchor="ctr"/>
+          <a:lstStyle/>
+          <a:p>
+            <a:pPr algn="ctr"/>
+            <a:r>
+              <a:rPr lang="de-DE" b="1" dirty="0" smtClean="0"/>
+              <a:t>Aktion</a:t>
+            </a:r>
+          </a:p>
+          <a:p>
+            <a:pPr algn="ctr"/>
+            <a:r>
+              <a:rPr lang="de-DE" b="1" dirty="0" smtClean="0"/>
+              <a:t>des </a:t>
+            </a:r>
+            <a:r>
+              <a:rPr lang="de-DE" b="1" dirty="0" err="1" smtClean="0"/>
+              <a:t>FuseeAT</a:t>
+            </a:r>
+            <a:endParaRPr lang="de-DE" b="1" dirty="0"/>
+          </a:p>
+        </p:txBody>
+      </p:sp>
+      <p:sp>
+        <p:nvSpPr>
+          <p:cNvPr id="6" name="Abgerundetes Rechteck 5"/>
+          <p:cNvSpPr/>
+          <p:nvPr/>
+        </p:nvSpPr>
+        <p:spPr>
+          <a:xfrm>
+            <a:off x="9003233" y="3158836"/>
+            <a:ext cx="2095202" cy="1018309"/>
+          </a:xfrm>
+          <a:prstGeom prst="roundRect">
+            <a:avLst/>
+          </a:prstGeom>
+          <a:ln>
+            <a:noFill/>
+          </a:ln>
+        </p:spPr>
+        <p:style>
+          <a:lnRef idx="2">
+            <a:schemeClr val="accent6"/>
+          </a:lnRef>
+          <a:fillRef idx="1001">
+            <a:schemeClr val="lt1"/>
+          </a:fillRef>
+          <a:effectRef idx="0">
+            <a:schemeClr val="accent6"/>
+          </a:effectRef>
+          <a:fontRef idx="minor">
+            <a:schemeClr val="dk1"/>
+          </a:fontRef>
+        </p:style>
+        <p:txBody>
+          <a:bodyPr rtlCol="0" anchor="ctr"/>
+          <a:lstStyle/>
+          <a:p>
+            <a:pPr algn="ctr"/>
+            <a:r>
+              <a:rPr lang="de-DE" b="1" dirty="0" smtClean="0"/>
+              <a:t>Repräsentation der Daten</a:t>
+            </a:r>
+            <a:endParaRPr lang="de-DE" b="1" dirty="0"/>
+          </a:p>
+        </p:txBody>
+      </p:sp>
+      <p:sp>
+        <p:nvSpPr>
+          <p:cNvPr id="7" name="Pfeil nach rechts 6"/>
+          <p:cNvSpPr/>
+          <p:nvPr/>
+        </p:nvSpPr>
+        <p:spPr>
+          <a:xfrm>
+            <a:off x="3955386" y="3475755"/>
+            <a:ext cx="685800" cy="384465"/>
+          </a:xfrm>
+          <a:prstGeom prst="rightArrow">
+            <a:avLst/>
+          </a:prstGeom>
+          <a:ln>
+            <a:noFill/>
+          </a:ln>
+        </p:spPr>
+        <p:style>
+          <a:lnRef idx="2">
+            <a:schemeClr val="accent6"/>
+          </a:lnRef>
+          <a:fillRef idx="1">
+            <a:schemeClr val="lt1"/>
+          </a:fillRef>
+          <a:effectRef idx="0">
+            <a:schemeClr val="accent6"/>
+          </a:effectRef>
+          <a:fontRef idx="minor">
+            <a:schemeClr val="dk1"/>
+          </a:fontRef>
+        </p:style>
+        <p:txBody>
+          <a:bodyPr rtlCol="0" anchor="ctr"/>
+          <a:lstStyle/>
+          <a:p>
+            <a:pPr algn="ctr"/>
+            <a:endParaRPr lang="de-DE"/>
+          </a:p>
+        </p:txBody>
+      </p:sp>
+      <p:sp>
+        <p:nvSpPr>
+          <p:cNvPr id="9" name="Pfeil nach rechts 8"/>
+          <p:cNvSpPr/>
+          <p:nvPr/>
+        </p:nvSpPr>
+        <p:spPr>
+          <a:xfrm>
+            <a:off x="7707919" y="3512120"/>
+            <a:ext cx="685800" cy="384465"/>
+          </a:xfrm>
+          <a:prstGeom prst="rightArrow">
+            <a:avLst/>
+          </a:prstGeom>
+          <a:ln>
+            <a:noFill/>
+          </a:ln>
+        </p:spPr>
+        <p:style>
+          <a:lnRef idx="2">
+            <a:schemeClr val="accent6"/>
+          </a:lnRef>
+          <a:fillRef idx="1">
+            <a:schemeClr val="lt1"/>
+          </a:fillRef>
+          <a:effectRef idx="0">
+            <a:schemeClr val="accent6"/>
+          </a:effectRef>
+          <a:fontRef idx="minor">
+            <a:schemeClr val="dk1"/>
+          </a:fontRef>
+        </p:style>
+        <p:txBody>
+          <a:bodyPr rtlCol="0" anchor="ctr"/>
+          <a:lstStyle/>
+          <a:p>
+            <a:pPr algn="ctr"/>
+            <a:endParaRPr lang="de-DE"/>
           </a:p>
         </p:txBody>
       </p:sp>
     </p:spTree>
     <p:extLst>
       <p:ext uri="{BB962C8B-B14F-4D97-AF65-F5344CB8AC3E}">
-        <p14:creationId xmlns:p14="http://schemas.microsoft.com/office/powerpoint/2010/main" val="1620754771"/>
+        <p14:creationId xmlns:p14="http://schemas.microsoft.com/office/powerpoint/2010/main" val="281458669"/>
       </p:ext>
     </p:extLst>
   </p:cSld>
@@ -7542,10 +8418,14 @@
           <a:lstStyle/>
           <a:p>
             <a:r>
-              <a:rPr lang="de-DE" dirty="0" smtClean="0"/>
-              <a:t>Verabschiedung und Dank</a:t>
-            </a:r>
-            <a:endParaRPr lang="de-DE" dirty="0"/>
+              <a:rPr lang="de-DE" dirty="0"/>
+              <a:t>Fragen Block B </a:t>
+            </a:r>
+            <a:r>
+              <a:rPr lang="de-DE" sz="2000" i="1" dirty="0"/>
+              <a:t>(Prof. C. Müller)</a:t>
+            </a:r>
+            <a:endParaRPr lang="de-DE" sz="2000" dirty="0"/>
           </a:p>
         </p:txBody>
       </p:sp>
@@ -7566,25 +8446,437 @@
           <a:p>
             <a:r>
               <a:rPr lang="de-DE" dirty="0" smtClean="0"/>
-              <a:t>Vielen</a:t>
+              <a:t>Trigger zu Beginn:</a:t>
+            </a:r>
+          </a:p>
+          <a:p>
+            <a:pPr lvl="1"/>
+            <a:r>
+              <a:rPr lang="de-DE" dirty="0" smtClean="0"/>
+              <a:t>Von einem Hintergrundprozess oder GUI Aktion (Speichern eines Projektes) ausgehend.</a:t>
+            </a:r>
+          </a:p>
+          <a:p>
+            <a:pPr lvl="0"/>
+            <a:r>
+              <a:rPr lang="de-DE" dirty="0" smtClean="0"/>
+              <a:t>Endbedingungen:</a:t>
             </a:r>
             <a:r>
               <a:rPr lang="de-DE" baseline="0" dirty="0" smtClean="0"/>
-              <a:t> Dank an die Betreuer der Arbeit für ihre Unterstützung.</a:t>
-            </a:r>
-          </a:p>
-          <a:p>
+              <a:t> </a:t>
+            </a:r>
+            <a:r>
+              <a:rPr lang="de-DE" dirty="0" smtClean="0"/>
+              <a:t>Die</a:t>
+            </a:r>
             <a:r>
               <a:rPr lang="de-DE" baseline="0" dirty="0" smtClean="0"/>
-              <a:t>Vielen Dank an die Fakultät Digitale Medien für die Unterstützung in meiner Tätigkeit als Akademischer Mitarbeiter während des Bearbeitungszeitraums.</a:t>
-            </a:r>
+              <a:t> </a:t>
+            </a:r>
+            <a:r>
+              <a:rPr lang="de-DE" dirty="0" smtClean="0"/>
+              <a:t>„Objektrelation“ muss für das </a:t>
+            </a:r>
+            <a:r>
+              <a:rPr lang="de-DE" dirty="0" err="1" smtClean="0"/>
+              <a:t>FuseeAT</a:t>
+            </a:r>
+            <a:r>
+              <a:rPr lang="de-DE" dirty="0" smtClean="0"/>
+              <a:t> </a:t>
+            </a:r>
+            <a:r>
+              <a:rPr lang="de-DE" baseline="0" dirty="0" smtClean="0"/>
+              <a:t>identifizierbar bleiben.</a:t>
+            </a:r>
+          </a:p>
+          <a:p>
+            <a:pPr lvl="1"/>
+            <a:r>
+              <a:rPr lang="de-DE" baseline="0" dirty="0" smtClean="0"/>
+              <a:t>Lesbares Format mit Informationen für das </a:t>
+            </a:r>
+            <a:r>
+              <a:rPr lang="de-DE" baseline="0" dirty="0" err="1" smtClean="0"/>
+              <a:t>FuseeAT</a:t>
+            </a:r>
+            <a:r>
+              <a:rPr lang="de-DE" baseline="0" dirty="0" smtClean="0"/>
+              <a:t> (XML in </a:t>
+            </a:r>
+            <a:r>
+              <a:rPr lang="de-DE" baseline="0" dirty="0" err="1" smtClean="0"/>
+              <a:t>FuseeAT</a:t>
+            </a:r>
+            <a:r>
+              <a:rPr lang="de-DE" baseline="0" dirty="0" smtClean="0"/>
+              <a:t>) enthält:</a:t>
+            </a:r>
+          </a:p>
+          <a:p>
+            <a:pPr lvl="2"/>
+            <a:r>
+              <a:rPr lang="de-DE" baseline="0" dirty="0" smtClean="0"/>
+              <a:t>IDs</a:t>
+            </a:r>
+          </a:p>
+          <a:p>
+            <a:pPr lvl="2"/>
+            <a:r>
+              <a:rPr lang="de-DE" baseline="0" dirty="0" smtClean="0"/>
+              <a:t>Pfade</a:t>
+            </a:r>
+          </a:p>
+          <a:p>
+            <a:pPr lvl="2"/>
+            <a:r>
+              <a:rPr lang="de-DE" baseline="0" dirty="0" smtClean="0"/>
+              <a:t>Prüfsummen</a:t>
+            </a:r>
+          </a:p>
+          <a:p>
+            <a:r>
+              <a:rPr lang="de-DE" dirty="0" smtClean="0"/>
+              <a:t>Wie kann also die das Problem der Aktion gelöst werden?</a:t>
+            </a:r>
+            <a:endParaRPr lang="de-DE" baseline="0" dirty="0" smtClean="0"/>
           </a:p>
         </p:txBody>
       </p:sp>
     </p:spTree>
     <p:extLst>
       <p:ext uri="{BB962C8B-B14F-4D97-AF65-F5344CB8AC3E}">
-        <p14:creationId xmlns:p14="http://schemas.microsoft.com/office/powerpoint/2010/main" val="1386344869"/>
+        <p14:creationId xmlns:p14="http://schemas.microsoft.com/office/powerpoint/2010/main" val="1414374061"/>
+      </p:ext>
+    </p:extLst>
+  </p:cSld>
+  <p:clrMapOvr>
+    <a:masterClrMapping/>
+  </p:clrMapOvr>
+  <p:timing>
+    <p:tnLst>
+      <p:par>
+        <p:cTn id="1" dur="indefinite" restart="never" nodeType="tmRoot"/>
+      </p:par>
+    </p:tnLst>
+  </p:timing>
+</p:sld>
+</file>
+
+<file path=ppt/slides/slide18.xml><?xml version="1.0" encoding="utf-8"?>
+<p:sld xmlns:a="http://schemas.openxmlformats.org/drawingml/2006/main" xmlns:r="http://schemas.openxmlformats.org/officeDocument/2006/relationships" xmlns:p="http://schemas.openxmlformats.org/presentationml/2006/main">
+  <p:cSld>
+    <p:spTree>
+      <p:nvGrpSpPr>
+        <p:cNvPr id="1" name=""/>
+        <p:cNvGrpSpPr/>
+        <p:nvPr/>
+      </p:nvGrpSpPr>
+      <p:grpSpPr>
+        <a:xfrm>
+          <a:off x="0" y="0"/>
+          <a:ext cx="0" cy="0"/>
+          <a:chOff x="0" y="0"/>
+          <a:chExt cx="0" cy="0"/>
+        </a:xfrm>
+      </p:grpSpPr>
+      <p:sp>
+        <p:nvSpPr>
+          <p:cNvPr id="2" name="Titel 1"/>
+          <p:cNvSpPr>
+            <a:spLocks noGrp="1"/>
+          </p:cNvSpPr>
+          <p:nvPr>
+            <p:ph type="title"/>
+          </p:nvPr>
+        </p:nvSpPr>
+        <p:spPr/>
+        <p:txBody>
+          <a:bodyPr/>
+          <a:lstStyle/>
+          <a:p>
+            <a:r>
+              <a:rPr lang="de-DE" dirty="0" smtClean="0"/>
+              <a:t>Fragen</a:t>
+            </a:r>
+            <a:r>
+              <a:rPr lang="de-DE" baseline="0" dirty="0" smtClean="0"/>
+              <a:t> Block B </a:t>
+            </a:r>
+            <a:r>
+              <a:rPr lang="de-DE" sz="2000" i="1" baseline="0" dirty="0" smtClean="0"/>
+              <a:t>(Prof. C. Müller)</a:t>
+            </a:r>
+            <a:endParaRPr lang="de-DE" sz="2000" i="1" dirty="0"/>
+          </a:p>
+        </p:txBody>
+      </p:sp>
+      <p:sp>
+        <p:nvSpPr>
+          <p:cNvPr id="3" name="Inhaltsplatzhalter 2"/>
+          <p:cNvSpPr>
+            <a:spLocks noGrp="1"/>
+          </p:cNvSpPr>
+          <p:nvPr>
+            <p:ph idx="1"/>
+          </p:nvPr>
+        </p:nvSpPr>
+        <p:spPr/>
+        <p:txBody>
+          <a:bodyPr>
+            <a:normAutofit lnSpcReduction="10000"/>
+          </a:bodyPr>
+          <a:lstStyle/>
+          <a:p>
+            <a:r>
+              <a:rPr lang="de-DE" dirty="0" smtClean="0"/>
+              <a:t>„</a:t>
+            </a:r>
+            <a:r>
+              <a:rPr lang="de-DE" dirty="0" err="1" smtClean="0"/>
+              <a:t>Deliverable</a:t>
+            </a:r>
+            <a:r>
+              <a:rPr lang="de-DE" dirty="0" smtClean="0"/>
+              <a:t>“ Repräsentation</a:t>
+            </a:r>
+            <a:r>
+              <a:rPr lang="de-DE" baseline="0" dirty="0" smtClean="0"/>
+              <a:t> als C# Klasse für Programmierer</a:t>
+            </a:r>
+          </a:p>
+          <a:p>
+            <a:pPr lvl="1"/>
+            <a:r>
+              <a:rPr lang="de-DE" dirty="0" smtClean="0"/>
+              <a:t>Als Partial Class repräsentieren</a:t>
+            </a:r>
+          </a:p>
+          <a:p>
+            <a:pPr lvl="2"/>
+            <a:r>
+              <a:rPr lang="de-DE" dirty="0" smtClean="0"/>
+              <a:t>Klasse aufgeteilt auf mehrere Files</a:t>
+            </a:r>
+          </a:p>
+          <a:p>
+            <a:pPr lvl="2"/>
+            <a:r>
+              <a:rPr lang="de-DE" dirty="0" smtClean="0"/>
+              <a:t>Compiler baut daraus wieder eine Klasse</a:t>
+            </a:r>
+          </a:p>
+          <a:p>
+            <a:pPr lvl="1"/>
+            <a:r>
+              <a:rPr lang="de-DE" dirty="0" smtClean="0"/>
+              <a:t>Das ermöglicht:</a:t>
+            </a:r>
+          </a:p>
+          <a:p>
+            <a:pPr lvl="2"/>
+            <a:r>
+              <a:rPr lang="de-DE" dirty="0" smtClean="0"/>
+              <a:t>Sauberen</a:t>
+            </a:r>
+            <a:r>
+              <a:rPr lang="de-DE" baseline="0" dirty="0" smtClean="0"/>
+              <a:t> Code.</a:t>
+            </a:r>
+          </a:p>
+          <a:p>
+            <a:pPr lvl="2"/>
+            <a:r>
+              <a:rPr lang="de-DE" dirty="0" smtClean="0"/>
+              <a:t>Generierter</a:t>
+            </a:r>
+            <a:r>
+              <a:rPr lang="de-DE" baseline="0" dirty="0" smtClean="0"/>
+              <a:t> Code getrennt von selbst erstelltem.</a:t>
+            </a:r>
+          </a:p>
+          <a:p>
+            <a:pPr lvl="2"/>
+            <a:r>
+              <a:rPr lang="de-DE" baseline="0" dirty="0" smtClean="0"/>
+              <a:t>System greift nicht in Nutzercode ein.</a:t>
+            </a:r>
+          </a:p>
+          <a:p>
+            <a:pPr lvl="2"/>
+            <a:r>
+              <a:rPr lang="de-DE" baseline="0" dirty="0" smtClean="0"/>
+              <a:t>Informationen zur Projektverwaltung stecken im automatisch generierten Teil. (bzw. Verweise auf XML Datencontainer)</a:t>
+            </a:r>
+          </a:p>
+          <a:p>
+            <a:pPr lvl="1"/>
+            <a:r>
+              <a:rPr lang="de-DE" dirty="0" smtClean="0"/>
+              <a:t>Das bedingt:</a:t>
+            </a:r>
+          </a:p>
+          <a:p>
+            <a:pPr lvl="2"/>
+            <a:r>
+              <a:rPr lang="de-DE" dirty="0" smtClean="0"/>
+              <a:t>Kontrollmechanismen</a:t>
+            </a:r>
+            <a:r>
+              <a:rPr lang="de-DE" baseline="0" dirty="0" smtClean="0"/>
+              <a:t> im Framework ob z.B. Dateien schon vorhanden sind.</a:t>
+            </a:r>
+          </a:p>
+        </p:txBody>
+      </p:sp>
+    </p:spTree>
+    <p:extLst>
+      <p:ext uri="{BB962C8B-B14F-4D97-AF65-F5344CB8AC3E}">
+        <p14:creationId xmlns:p14="http://schemas.microsoft.com/office/powerpoint/2010/main" val="1492797721"/>
+      </p:ext>
+    </p:extLst>
+  </p:cSld>
+  <p:clrMapOvr>
+    <a:masterClrMapping/>
+  </p:clrMapOvr>
+  <p:timing>
+    <p:tnLst>
+      <p:par>
+        <p:cTn id="1" dur="indefinite" restart="never" nodeType="tmRoot"/>
+      </p:par>
+    </p:tnLst>
+  </p:timing>
+</p:sld>
+</file>
+
+<file path=ppt/slides/slide19.xml><?xml version="1.0" encoding="utf-8"?>
+<p:sld xmlns:a="http://schemas.openxmlformats.org/drawingml/2006/main" xmlns:r="http://schemas.openxmlformats.org/officeDocument/2006/relationships" xmlns:p="http://schemas.openxmlformats.org/presentationml/2006/main">
+  <p:cSld>
+    <p:spTree>
+      <p:nvGrpSpPr>
+        <p:cNvPr id="1" name=""/>
+        <p:cNvGrpSpPr/>
+        <p:nvPr/>
+      </p:nvGrpSpPr>
+      <p:grpSpPr>
+        <a:xfrm>
+          <a:off x="0" y="0"/>
+          <a:ext cx="0" cy="0"/>
+          <a:chOff x="0" y="0"/>
+          <a:chExt cx="0" cy="0"/>
+        </a:xfrm>
+      </p:grpSpPr>
+      <p:sp>
+        <p:nvSpPr>
+          <p:cNvPr id="2" name="Titel 1"/>
+          <p:cNvSpPr>
+            <a:spLocks noGrp="1"/>
+          </p:cNvSpPr>
+          <p:nvPr>
+            <p:ph type="title"/>
+          </p:nvPr>
+        </p:nvSpPr>
+        <p:spPr/>
+        <p:txBody>
+          <a:bodyPr/>
+          <a:lstStyle/>
+          <a:p>
+            <a:r>
+              <a:rPr lang="de-DE" dirty="0">
+                <a:solidFill>
+                  <a:srgbClr val="EBEBEB"/>
+                </a:solidFill>
+              </a:rPr>
+              <a:t>Fragen Block B </a:t>
+            </a:r>
+            <a:r>
+              <a:rPr lang="de-DE" sz="2000" i="1" dirty="0">
+                <a:solidFill>
+                  <a:srgbClr val="EBEBEB"/>
+                </a:solidFill>
+              </a:rPr>
+              <a:t>(Prof. C. Müller)</a:t>
+            </a:r>
+            <a:endParaRPr lang="de-DE" dirty="0"/>
+          </a:p>
+        </p:txBody>
+      </p:sp>
+      <p:sp>
+        <p:nvSpPr>
+          <p:cNvPr id="3" name="Inhaltsplatzhalter 2"/>
+          <p:cNvSpPr>
+            <a:spLocks noGrp="1"/>
+          </p:cNvSpPr>
+          <p:nvPr>
+            <p:ph idx="1"/>
+          </p:nvPr>
+        </p:nvSpPr>
+        <p:spPr/>
+        <p:txBody>
+          <a:bodyPr/>
+          <a:lstStyle/>
+          <a:p>
+            <a:r>
+              <a:rPr lang="de-DE" dirty="0" smtClean="0"/>
+              <a:t>XML Datencontainer</a:t>
+            </a:r>
+          </a:p>
+          <a:p>
+            <a:pPr lvl="1"/>
+            <a:r>
+              <a:rPr lang="de-DE" dirty="0" smtClean="0"/>
+              <a:t>Repräsentiert durch ein </a:t>
+            </a:r>
+            <a:r>
+              <a:rPr lang="de-DE" dirty="0" err="1" smtClean="0"/>
+              <a:t>Struct</a:t>
+            </a:r>
+            <a:endParaRPr lang="de-DE" dirty="0" smtClean="0"/>
+          </a:p>
+          <a:p>
+            <a:pPr lvl="1"/>
+            <a:r>
+              <a:rPr lang="de-DE" dirty="0" err="1" smtClean="0"/>
+              <a:t>Serialisierbar</a:t>
+            </a:r>
+            <a:r>
+              <a:rPr lang="de-DE" dirty="0" smtClean="0"/>
+              <a:t> über C# Mechanismen</a:t>
+            </a:r>
+          </a:p>
+          <a:p>
+            <a:pPr lvl="1"/>
+            <a:r>
+              <a:rPr lang="de-DE" dirty="0" smtClean="0"/>
+              <a:t>Enthält</a:t>
+            </a:r>
+            <a:r>
+              <a:rPr lang="de-DE" baseline="0" dirty="0" smtClean="0"/>
+              <a:t> Daten zur „</a:t>
+            </a:r>
+            <a:r>
+              <a:rPr lang="de-DE" baseline="0" dirty="0" err="1" smtClean="0"/>
+              <a:t>Deliverable</a:t>
+            </a:r>
+            <a:r>
+              <a:rPr lang="de-DE" baseline="0" dirty="0" smtClean="0"/>
+              <a:t>“ / „Asset“ Code Relation.</a:t>
+            </a:r>
+          </a:p>
+          <a:p>
+            <a:pPr lvl="1"/>
+            <a:r>
+              <a:rPr lang="de-DE" baseline="0" dirty="0" smtClean="0"/>
+              <a:t>Wird benötigt wenn ein Projekt im Editor geöffnet wird um Relationen wieder herzustellen.</a:t>
+            </a:r>
+          </a:p>
+        </p:txBody>
+      </p:sp>
+    </p:spTree>
+    <p:extLst>
+      <p:ext uri="{BB962C8B-B14F-4D97-AF65-F5344CB8AC3E}">
+        <p14:creationId xmlns:p14="http://schemas.microsoft.com/office/powerpoint/2010/main" val="1784599144"/>
       </p:ext>
     </p:extLst>
   </p:cSld>
@@ -7725,6 +9017,1359 @@
     <p:extLst>
       <p:ext uri="{BB962C8B-B14F-4D97-AF65-F5344CB8AC3E}">
         <p14:creationId xmlns:p14="http://schemas.microsoft.com/office/powerpoint/2010/main" val="4118849458"/>
+      </p:ext>
+    </p:extLst>
+  </p:cSld>
+  <p:clrMapOvr>
+    <a:masterClrMapping/>
+  </p:clrMapOvr>
+  <p:timing>
+    <p:tnLst>
+      <p:par>
+        <p:cTn id="1" dur="indefinite" restart="never" nodeType="tmRoot"/>
+      </p:par>
+    </p:tnLst>
+  </p:timing>
+</p:sld>
+</file>
+
+<file path=ppt/slides/slide20.xml><?xml version="1.0" encoding="utf-8"?>
+<p:sld xmlns:a="http://schemas.openxmlformats.org/drawingml/2006/main" xmlns:r="http://schemas.openxmlformats.org/officeDocument/2006/relationships" xmlns:p="http://schemas.openxmlformats.org/presentationml/2006/main">
+  <p:cSld>
+    <p:spTree>
+      <p:nvGrpSpPr>
+        <p:cNvPr id="1" name=""/>
+        <p:cNvGrpSpPr/>
+        <p:nvPr/>
+      </p:nvGrpSpPr>
+      <p:grpSpPr>
+        <a:xfrm>
+          <a:off x="0" y="0"/>
+          <a:ext cx="0" cy="0"/>
+          <a:chOff x="0" y="0"/>
+          <a:chExt cx="0" cy="0"/>
+        </a:xfrm>
+      </p:grpSpPr>
+      <p:sp>
+        <p:nvSpPr>
+          <p:cNvPr id="2" name="Titel 1"/>
+          <p:cNvSpPr>
+            <a:spLocks noGrp="1"/>
+          </p:cNvSpPr>
+          <p:nvPr>
+            <p:ph type="title"/>
+          </p:nvPr>
+        </p:nvSpPr>
+        <p:spPr/>
+        <p:txBody>
+          <a:bodyPr/>
+          <a:lstStyle/>
+          <a:p>
+            <a:r>
+              <a:rPr lang="de-DE" dirty="0">
+                <a:solidFill>
+                  <a:srgbClr val="EBEBEB"/>
+                </a:solidFill>
+              </a:rPr>
+              <a:t>Fragen Block B </a:t>
+            </a:r>
+            <a:r>
+              <a:rPr lang="de-DE" sz="2000" i="1" dirty="0">
+                <a:solidFill>
+                  <a:srgbClr val="EBEBEB"/>
+                </a:solidFill>
+              </a:rPr>
+              <a:t>(Prof. C. Müller)</a:t>
+            </a:r>
+            <a:endParaRPr lang="de-DE" dirty="0"/>
+          </a:p>
+        </p:txBody>
+      </p:sp>
+      <p:sp>
+        <p:nvSpPr>
+          <p:cNvPr id="3" name="Inhaltsplatzhalter 2"/>
+          <p:cNvSpPr>
+            <a:spLocks noGrp="1"/>
+          </p:cNvSpPr>
+          <p:nvPr>
+            <p:ph idx="1"/>
+          </p:nvPr>
+        </p:nvSpPr>
+        <p:spPr/>
+        <p:txBody>
+          <a:bodyPr/>
+          <a:lstStyle/>
+          <a:p>
+            <a:r>
+              <a:rPr lang="de-DE" dirty="0" smtClean="0"/>
+              <a:t>Welche Vorteile ergeben sich aus diesem Lösungsweg?</a:t>
+            </a:r>
+          </a:p>
+          <a:p>
+            <a:pPr lvl="1"/>
+            <a:r>
+              <a:rPr lang="de-DE" dirty="0" smtClean="0"/>
+              <a:t>Programmierer kann Objekte im Code instanziieren.</a:t>
+            </a:r>
+          </a:p>
+          <a:p>
+            <a:pPr lvl="1"/>
+            <a:r>
+              <a:rPr lang="de-DE" baseline="0" dirty="0" smtClean="0"/>
+              <a:t>Relationsdaten automatisch vom </a:t>
+            </a:r>
+            <a:r>
+              <a:rPr lang="de-DE" baseline="0" dirty="0" err="1" smtClean="0"/>
+              <a:t>FuseeAT</a:t>
+            </a:r>
+            <a:r>
+              <a:rPr lang="de-DE" baseline="0" dirty="0" smtClean="0"/>
+              <a:t> generiert und behandelt.</a:t>
+            </a:r>
+          </a:p>
+          <a:p>
+            <a:pPr lvl="1"/>
+            <a:r>
+              <a:rPr lang="de-DE" baseline="0" dirty="0" smtClean="0"/>
+              <a:t>Partial </a:t>
+            </a:r>
+            <a:r>
+              <a:rPr lang="de-DE" baseline="0" dirty="0" err="1" smtClean="0"/>
+              <a:t>Classes</a:t>
+            </a:r>
+            <a:r>
+              <a:rPr lang="de-DE" baseline="0" dirty="0" smtClean="0"/>
+              <a:t> trennen</a:t>
+            </a:r>
+            <a:r>
+              <a:rPr lang="de-DE" dirty="0" smtClean="0"/>
+              <a:t> generierten und manuellen Code.</a:t>
+            </a:r>
+            <a:endParaRPr lang="de-DE" baseline="0" dirty="0" smtClean="0"/>
+          </a:p>
+          <a:p>
+            <a:pPr lvl="0"/>
+            <a:r>
+              <a:rPr lang="de-DE" dirty="0" smtClean="0"/>
+              <a:t>Wie sieht diese</a:t>
+            </a:r>
+            <a:r>
+              <a:rPr lang="de-DE" baseline="0" dirty="0" smtClean="0"/>
+              <a:t> Repräsentation grafisch aus?</a:t>
+            </a:r>
+          </a:p>
+          <a:p>
+            <a:pPr lvl="1"/>
+            <a:r>
+              <a:rPr lang="de-DE" dirty="0" smtClean="0"/>
+              <a:t>Das Schaubild verdeutlicht den Zusammenhang des Systems.</a:t>
+            </a:r>
+            <a:endParaRPr lang="de-DE" baseline="0" dirty="0" smtClean="0"/>
+          </a:p>
+        </p:txBody>
+      </p:sp>
+    </p:spTree>
+    <p:extLst>
+      <p:ext uri="{BB962C8B-B14F-4D97-AF65-F5344CB8AC3E}">
+        <p14:creationId xmlns:p14="http://schemas.microsoft.com/office/powerpoint/2010/main" val="3003060857"/>
+      </p:ext>
+    </p:extLst>
+  </p:cSld>
+  <p:clrMapOvr>
+    <a:masterClrMapping/>
+  </p:clrMapOvr>
+  <p:timing>
+    <p:tnLst>
+      <p:par>
+        <p:cTn id="1" dur="indefinite" restart="never" nodeType="tmRoot"/>
+      </p:par>
+    </p:tnLst>
+  </p:timing>
+</p:sld>
+</file>
+
+<file path=ppt/slides/slide21.xml><?xml version="1.0" encoding="utf-8"?>
+<p:sld xmlns:a="http://schemas.openxmlformats.org/drawingml/2006/main" xmlns:r="http://schemas.openxmlformats.org/officeDocument/2006/relationships" xmlns:p="http://schemas.openxmlformats.org/presentationml/2006/main">
+  <p:cSld>
+    <p:spTree>
+      <p:nvGrpSpPr>
+        <p:cNvPr id="1" name=""/>
+        <p:cNvGrpSpPr/>
+        <p:nvPr/>
+      </p:nvGrpSpPr>
+      <p:grpSpPr>
+        <a:xfrm>
+          <a:off x="0" y="0"/>
+          <a:ext cx="0" cy="0"/>
+          <a:chOff x="0" y="0"/>
+          <a:chExt cx="0" cy="0"/>
+        </a:xfrm>
+      </p:grpSpPr>
+      <p:sp>
+        <p:nvSpPr>
+          <p:cNvPr id="2" name="Titel 1"/>
+          <p:cNvSpPr>
+            <a:spLocks noGrp="1"/>
+          </p:cNvSpPr>
+          <p:nvPr>
+            <p:ph type="title"/>
+          </p:nvPr>
+        </p:nvSpPr>
+        <p:spPr/>
+        <p:txBody>
+          <a:bodyPr/>
+          <a:lstStyle/>
+          <a:p>
+            <a:r>
+              <a:rPr lang="de-DE" dirty="0">
+                <a:solidFill>
+                  <a:srgbClr val="EBEBEB"/>
+                </a:solidFill>
+              </a:rPr>
+              <a:t>Fragen Block B </a:t>
+            </a:r>
+            <a:r>
+              <a:rPr lang="de-DE" sz="2000" i="1" dirty="0">
+                <a:solidFill>
+                  <a:srgbClr val="EBEBEB"/>
+                </a:solidFill>
+              </a:rPr>
+              <a:t>(Prof. C. Müller)</a:t>
+            </a:r>
+            <a:endParaRPr lang="de-DE" dirty="0"/>
+          </a:p>
+        </p:txBody>
+      </p:sp>
+      <p:pic>
+        <p:nvPicPr>
+          <p:cNvPr id="4" name="Inhaltsplatzhalter 3"/>
+          <p:cNvPicPr>
+            <a:picLocks noGrp="1" noChangeAspect="1"/>
+          </p:cNvPicPr>
+          <p:nvPr>
+            <p:ph idx="1"/>
+          </p:nvPr>
+        </p:nvPicPr>
+        <p:blipFill>
+          <a:blip r:embed="rId2">
+            <a:extLst>
+              <a:ext uri="{28A0092B-C50C-407E-A947-70E740481C1C}">
+                <a14:useLocalDpi xmlns:a14="http://schemas.microsoft.com/office/drawing/2010/main" val="0"/>
+              </a:ext>
+            </a:extLst>
+          </a:blip>
+          <a:stretch>
+            <a:fillRect/>
+          </a:stretch>
+        </p:blipFill>
+        <p:spPr>
+          <a:xfrm>
+            <a:off x="2851666" y="1853248"/>
+            <a:ext cx="6762750" cy="3429000"/>
+          </a:xfrm>
+        </p:spPr>
+      </p:pic>
+    </p:spTree>
+    <p:extLst>
+      <p:ext uri="{BB962C8B-B14F-4D97-AF65-F5344CB8AC3E}">
+        <p14:creationId xmlns:p14="http://schemas.microsoft.com/office/powerpoint/2010/main" val="2588284234"/>
+      </p:ext>
+    </p:extLst>
+  </p:cSld>
+  <p:clrMapOvr>
+    <a:masterClrMapping/>
+  </p:clrMapOvr>
+  <p:timing>
+    <p:tnLst>
+      <p:par>
+        <p:cTn id="1" dur="indefinite" restart="never" nodeType="tmRoot"/>
+      </p:par>
+    </p:tnLst>
+  </p:timing>
+</p:sld>
+</file>
+
+<file path=ppt/slides/slide22.xml><?xml version="1.0" encoding="utf-8"?>
+<p:sld xmlns:a="http://schemas.openxmlformats.org/drawingml/2006/main" xmlns:r="http://schemas.openxmlformats.org/officeDocument/2006/relationships" xmlns:p="http://schemas.openxmlformats.org/presentationml/2006/main">
+  <p:cSld>
+    <p:spTree>
+      <p:nvGrpSpPr>
+        <p:cNvPr id="1" name=""/>
+        <p:cNvGrpSpPr/>
+        <p:nvPr/>
+      </p:nvGrpSpPr>
+      <p:grpSpPr>
+        <a:xfrm>
+          <a:off x="0" y="0"/>
+          <a:ext cx="0" cy="0"/>
+          <a:chOff x="0" y="0"/>
+          <a:chExt cx="0" cy="0"/>
+        </a:xfrm>
+      </p:grpSpPr>
+      <p:sp>
+        <p:nvSpPr>
+          <p:cNvPr id="2" name="Titel 1"/>
+          <p:cNvSpPr>
+            <a:spLocks noGrp="1"/>
+          </p:cNvSpPr>
+          <p:nvPr>
+            <p:ph type="title"/>
+          </p:nvPr>
+        </p:nvSpPr>
+        <p:spPr/>
+        <p:txBody>
+          <a:bodyPr/>
+          <a:lstStyle/>
+          <a:p>
+            <a:r>
+              <a:rPr lang="de-DE" dirty="0">
+                <a:solidFill>
+                  <a:srgbClr val="EBEBEB"/>
+                </a:solidFill>
+              </a:rPr>
+              <a:t>Fragen Block B </a:t>
+            </a:r>
+            <a:r>
+              <a:rPr lang="de-DE" sz="2000" i="1" dirty="0">
+                <a:solidFill>
+                  <a:srgbClr val="EBEBEB"/>
+                </a:solidFill>
+              </a:rPr>
+              <a:t>(Prof. C. Müller)</a:t>
+            </a:r>
+            <a:endParaRPr lang="de-DE" dirty="0"/>
+          </a:p>
+        </p:txBody>
+      </p:sp>
+      <p:sp>
+        <p:nvSpPr>
+          <p:cNvPr id="3" name="Inhaltsplatzhalter 2"/>
+          <p:cNvSpPr>
+            <a:spLocks noGrp="1"/>
+          </p:cNvSpPr>
+          <p:nvPr>
+            <p:ph idx="1"/>
+          </p:nvPr>
+        </p:nvSpPr>
+        <p:spPr/>
+        <p:txBody>
+          <a:bodyPr/>
+          <a:lstStyle/>
+          <a:p>
+            <a:r>
+              <a:rPr lang="de-DE" b="1" dirty="0"/>
+              <a:t>F2: -	Wie kann eine solche automatisiert generierte Brücke zwischen 3D-Modellierer und Programmierer funktionieren, </a:t>
+            </a:r>
+            <a:r>
+              <a:rPr lang="de-DE" b="1" dirty="0" smtClean="0"/>
+              <a:t>wenn:</a:t>
+            </a:r>
+          </a:p>
+          <a:p>
+            <a:pPr lvl="1"/>
+            <a:r>
+              <a:rPr lang="de-DE" b="1" dirty="0"/>
+              <a:t>A: Programmierer und Modellierer nicht über das vollständige </a:t>
+            </a:r>
+            <a:r>
+              <a:rPr lang="de-DE" b="1" dirty="0" err="1"/>
+              <a:t>Toolset</a:t>
+            </a:r>
+            <a:r>
+              <a:rPr lang="de-DE" b="1" dirty="0"/>
+              <a:t> verfügen (Modellierer hat nur C4D, Programmierer hat nur Visual Studio)? </a:t>
+            </a:r>
+          </a:p>
+          <a:p>
+            <a:pPr lvl="1"/>
+            <a:r>
+              <a:rPr lang="de-DE" sz="1600" dirty="0"/>
+              <a:t>B: Programmierer und Modellierer abwechselnd/gleichzeitig iterativ an ihren jeweiligen Bestandteilen arbeiten</a:t>
+            </a:r>
+            <a:r>
+              <a:rPr lang="de-DE" sz="1600" dirty="0" smtClean="0"/>
+              <a:t>?</a:t>
+            </a:r>
+          </a:p>
+        </p:txBody>
+      </p:sp>
+    </p:spTree>
+    <p:extLst>
+      <p:ext uri="{BB962C8B-B14F-4D97-AF65-F5344CB8AC3E}">
+        <p14:creationId xmlns:p14="http://schemas.microsoft.com/office/powerpoint/2010/main" val="968593373"/>
+      </p:ext>
+    </p:extLst>
+  </p:cSld>
+  <p:clrMapOvr>
+    <a:masterClrMapping/>
+  </p:clrMapOvr>
+  <p:timing>
+    <p:tnLst>
+      <p:par>
+        <p:cTn id="1" dur="indefinite" restart="never" nodeType="tmRoot"/>
+      </p:par>
+    </p:tnLst>
+  </p:timing>
+</p:sld>
+</file>
+
+<file path=ppt/slides/slide23.xml><?xml version="1.0" encoding="utf-8"?>
+<p:sld xmlns:a="http://schemas.openxmlformats.org/drawingml/2006/main" xmlns:r="http://schemas.openxmlformats.org/officeDocument/2006/relationships" xmlns:p="http://schemas.openxmlformats.org/presentationml/2006/main">
+  <p:cSld>
+    <p:spTree>
+      <p:nvGrpSpPr>
+        <p:cNvPr id="1" name=""/>
+        <p:cNvGrpSpPr/>
+        <p:nvPr/>
+      </p:nvGrpSpPr>
+      <p:grpSpPr>
+        <a:xfrm>
+          <a:off x="0" y="0"/>
+          <a:ext cx="0" cy="0"/>
+          <a:chOff x="0" y="0"/>
+          <a:chExt cx="0" cy="0"/>
+        </a:xfrm>
+      </p:grpSpPr>
+      <p:sp>
+        <p:nvSpPr>
+          <p:cNvPr id="2" name="Titel 1"/>
+          <p:cNvSpPr>
+            <a:spLocks noGrp="1"/>
+          </p:cNvSpPr>
+          <p:nvPr>
+            <p:ph type="title"/>
+          </p:nvPr>
+        </p:nvSpPr>
+        <p:spPr/>
+        <p:txBody>
+          <a:bodyPr/>
+          <a:lstStyle/>
+          <a:p>
+            <a:r>
+              <a:rPr lang="de-DE" dirty="0">
+                <a:solidFill>
+                  <a:srgbClr val="EBEBEB"/>
+                </a:solidFill>
+              </a:rPr>
+              <a:t>Fragen Block B </a:t>
+            </a:r>
+            <a:r>
+              <a:rPr lang="de-DE" sz="2000" i="1" dirty="0">
+                <a:solidFill>
+                  <a:srgbClr val="EBEBEB"/>
+                </a:solidFill>
+              </a:rPr>
+              <a:t>(Prof. C. Müller)</a:t>
+            </a:r>
+            <a:endParaRPr lang="de-DE" dirty="0"/>
+          </a:p>
+        </p:txBody>
+      </p:sp>
+      <p:sp>
+        <p:nvSpPr>
+          <p:cNvPr id="3" name="Inhaltsplatzhalter 2"/>
+          <p:cNvSpPr>
+            <a:spLocks noGrp="1"/>
+          </p:cNvSpPr>
+          <p:nvPr>
+            <p:ph idx="1"/>
+          </p:nvPr>
+        </p:nvSpPr>
+        <p:spPr/>
+        <p:txBody>
+          <a:bodyPr/>
+          <a:lstStyle/>
+          <a:p>
+            <a:r>
+              <a:rPr lang="de-DE" dirty="0" smtClean="0"/>
+              <a:t>Das </a:t>
+            </a:r>
+            <a:r>
+              <a:rPr lang="de-DE" dirty="0" err="1" smtClean="0"/>
+              <a:t>Toolset</a:t>
+            </a:r>
+            <a:r>
+              <a:rPr lang="de-DE" dirty="0" smtClean="0"/>
+              <a:t> übernimmt das Eintragen von Projektpfaden im Visual Studio .</a:t>
+            </a:r>
+            <a:r>
+              <a:rPr lang="de-DE" dirty="0" err="1" smtClean="0"/>
+              <a:t>sln</a:t>
+            </a:r>
+            <a:r>
+              <a:rPr lang="de-DE" dirty="0" smtClean="0"/>
+              <a:t> Projekt.</a:t>
+            </a:r>
+          </a:p>
+          <a:p>
+            <a:pPr lvl="1"/>
+            <a:r>
+              <a:rPr lang="de-DE" dirty="0" smtClean="0"/>
+              <a:t>Beim ersten generieren der Dateien.</a:t>
+            </a:r>
+          </a:p>
+          <a:p>
+            <a:pPr lvl="1"/>
+            <a:r>
+              <a:rPr lang="de-DE" dirty="0" smtClean="0"/>
+              <a:t>Speichert </a:t>
+            </a:r>
+            <a:r>
+              <a:rPr lang="de-DE" dirty="0" err="1" smtClean="0"/>
+              <a:t>Deliverables</a:t>
+            </a:r>
+            <a:r>
+              <a:rPr lang="de-DE" dirty="0" smtClean="0"/>
+              <a:t> im Projektverzeichnis (</a:t>
+            </a:r>
+            <a:r>
+              <a:rPr lang="de-DE" dirty="0" err="1" smtClean="0"/>
+              <a:t>Vorraussetzung</a:t>
+            </a:r>
+            <a:r>
+              <a:rPr lang="de-DE" dirty="0" smtClean="0"/>
+              <a:t>)</a:t>
+            </a:r>
+          </a:p>
+          <a:p>
+            <a:r>
+              <a:rPr lang="de-DE" dirty="0" smtClean="0"/>
+              <a:t>Somit sind die Dateien im Visual Studio Projekt ansprechbar</a:t>
+            </a:r>
+          </a:p>
+          <a:p>
+            <a:pPr lvl="1"/>
+            <a:r>
+              <a:rPr lang="de-DE" dirty="0" smtClean="0"/>
+              <a:t>Hierzu zählen:</a:t>
+            </a:r>
+          </a:p>
+          <a:p>
+            <a:pPr lvl="2"/>
+            <a:r>
+              <a:rPr lang="de-DE" dirty="0" err="1" smtClean="0"/>
+              <a:t>Deliverable</a:t>
+            </a:r>
+            <a:r>
+              <a:rPr lang="de-DE" dirty="0" smtClean="0"/>
+              <a:t> Dateien  (.</a:t>
+            </a:r>
+            <a:r>
+              <a:rPr lang="de-DE" dirty="0" err="1" smtClean="0"/>
+              <a:t>obj</a:t>
+            </a:r>
+            <a:r>
+              <a:rPr lang="de-DE" dirty="0" smtClean="0"/>
+              <a:t>, .</a:t>
+            </a:r>
+            <a:r>
+              <a:rPr lang="de-DE" dirty="0" err="1" smtClean="0"/>
+              <a:t>fbx</a:t>
+            </a:r>
+            <a:r>
+              <a:rPr lang="de-DE" dirty="0" smtClean="0"/>
+              <a:t>, etc.)</a:t>
+            </a:r>
+          </a:p>
+          <a:p>
+            <a:pPr lvl="2"/>
+            <a:r>
+              <a:rPr lang="de-DE" dirty="0" smtClean="0"/>
+              <a:t>Generierte Partial </a:t>
+            </a:r>
+            <a:r>
+              <a:rPr lang="de-DE" dirty="0" err="1" smtClean="0"/>
+              <a:t>Classes</a:t>
+            </a:r>
+            <a:r>
+              <a:rPr lang="de-DE" dirty="0" smtClean="0"/>
+              <a:t>	</a:t>
+            </a:r>
+          </a:p>
+          <a:p>
+            <a:r>
+              <a:rPr lang="de-DE" dirty="0" smtClean="0"/>
+              <a:t>Bedingungen hierfür:</a:t>
+            </a:r>
+          </a:p>
+          <a:p>
+            <a:pPr lvl="1"/>
+            <a:r>
+              <a:rPr lang="de-DE" dirty="0" smtClean="0"/>
+              <a:t>Tool kann die Pfade der Objekte Abfragen und hat Zugriff auf das Dateisystem (Cinema 4D API ermöglicht das).</a:t>
+            </a:r>
+          </a:p>
+          <a:p>
+            <a:endParaRPr lang="de-DE" dirty="0"/>
+          </a:p>
+        </p:txBody>
+      </p:sp>
+    </p:spTree>
+    <p:extLst>
+      <p:ext uri="{BB962C8B-B14F-4D97-AF65-F5344CB8AC3E}">
+        <p14:creationId xmlns:p14="http://schemas.microsoft.com/office/powerpoint/2010/main" val="1384580296"/>
+      </p:ext>
+    </p:extLst>
+  </p:cSld>
+  <p:clrMapOvr>
+    <a:masterClrMapping/>
+  </p:clrMapOvr>
+  <p:timing>
+    <p:tnLst>
+      <p:par>
+        <p:cTn id="1" dur="indefinite" restart="never" nodeType="tmRoot"/>
+      </p:par>
+    </p:tnLst>
+  </p:timing>
+</p:sld>
+</file>
+
+<file path=ppt/slides/slide24.xml><?xml version="1.0" encoding="utf-8"?>
+<p:sld xmlns:a="http://schemas.openxmlformats.org/drawingml/2006/main" xmlns:r="http://schemas.openxmlformats.org/officeDocument/2006/relationships" xmlns:p="http://schemas.openxmlformats.org/presentationml/2006/main">
+  <p:cSld>
+    <p:spTree>
+      <p:nvGrpSpPr>
+        <p:cNvPr id="1" name=""/>
+        <p:cNvGrpSpPr/>
+        <p:nvPr/>
+      </p:nvGrpSpPr>
+      <p:grpSpPr>
+        <a:xfrm>
+          <a:off x="0" y="0"/>
+          <a:ext cx="0" cy="0"/>
+          <a:chOff x="0" y="0"/>
+          <a:chExt cx="0" cy="0"/>
+        </a:xfrm>
+      </p:grpSpPr>
+      <p:sp>
+        <p:nvSpPr>
+          <p:cNvPr id="2" name="Titel 1"/>
+          <p:cNvSpPr>
+            <a:spLocks noGrp="1"/>
+          </p:cNvSpPr>
+          <p:nvPr>
+            <p:ph type="title"/>
+          </p:nvPr>
+        </p:nvSpPr>
+        <p:spPr/>
+        <p:txBody>
+          <a:bodyPr/>
+          <a:lstStyle/>
+          <a:p>
+            <a:r>
+              <a:rPr lang="de-DE" dirty="0">
+                <a:solidFill>
+                  <a:srgbClr val="EBEBEB"/>
+                </a:solidFill>
+              </a:rPr>
+              <a:t>Fragen Block B </a:t>
+            </a:r>
+            <a:r>
+              <a:rPr lang="de-DE" sz="2000" i="1" dirty="0">
+                <a:solidFill>
+                  <a:srgbClr val="EBEBEB"/>
+                </a:solidFill>
+              </a:rPr>
+              <a:t>(Prof. C. Müller)</a:t>
+            </a:r>
+            <a:endParaRPr lang="de-DE" dirty="0"/>
+          </a:p>
+        </p:txBody>
+      </p:sp>
+      <p:sp>
+        <p:nvSpPr>
+          <p:cNvPr id="3" name="Inhaltsplatzhalter 2"/>
+          <p:cNvSpPr>
+            <a:spLocks noGrp="1"/>
+          </p:cNvSpPr>
+          <p:nvPr>
+            <p:ph idx="1"/>
+          </p:nvPr>
+        </p:nvSpPr>
+        <p:spPr/>
+        <p:txBody>
+          <a:bodyPr/>
+          <a:lstStyle/>
+          <a:p>
+            <a:r>
+              <a:rPr lang="de-DE" b="1" dirty="0"/>
+              <a:t>F2: -	Wie kann eine solche automatisiert generierte Brücke zwischen 3D-Modellierer und Programmierer funktionieren, </a:t>
+            </a:r>
+            <a:r>
+              <a:rPr lang="de-DE" b="1" dirty="0" smtClean="0"/>
+              <a:t>wenn:</a:t>
+            </a:r>
+          </a:p>
+          <a:p>
+            <a:pPr lvl="1"/>
+            <a:r>
+              <a:rPr lang="de-DE" sz="1600" dirty="0"/>
+              <a:t>A: Programmierer und Modellierer nicht über das vollständige </a:t>
+            </a:r>
+            <a:r>
+              <a:rPr lang="de-DE" sz="1600" dirty="0" err="1"/>
+              <a:t>Toolset</a:t>
+            </a:r>
+            <a:r>
+              <a:rPr lang="de-DE" sz="1600" dirty="0"/>
+              <a:t> verfügen (Modellierer hat nur C4D, Programmierer hat nur Visual Studio)? </a:t>
+            </a:r>
+          </a:p>
+          <a:p>
+            <a:pPr lvl="1"/>
+            <a:r>
+              <a:rPr lang="de-DE" b="1" dirty="0"/>
+              <a:t>B: Programmierer und Modellierer abwechselnd/gleichzeitig iterativ an ihren jeweiligen Bestandteilen arbeiten</a:t>
+            </a:r>
+            <a:r>
+              <a:rPr lang="de-DE" b="1" dirty="0" smtClean="0"/>
+              <a:t>?</a:t>
+            </a:r>
+          </a:p>
+        </p:txBody>
+      </p:sp>
+    </p:spTree>
+    <p:extLst>
+      <p:ext uri="{BB962C8B-B14F-4D97-AF65-F5344CB8AC3E}">
+        <p14:creationId xmlns:p14="http://schemas.microsoft.com/office/powerpoint/2010/main" val="2838863598"/>
+      </p:ext>
+    </p:extLst>
+  </p:cSld>
+  <p:clrMapOvr>
+    <a:masterClrMapping/>
+  </p:clrMapOvr>
+  <p:timing>
+    <p:tnLst>
+      <p:par>
+        <p:cTn id="1" dur="indefinite" restart="never" nodeType="tmRoot"/>
+      </p:par>
+    </p:tnLst>
+  </p:timing>
+</p:sld>
+</file>
+
+<file path=ppt/slides/slide25.xml><?xml version="1.0" encoding="utf-8"?>
+<p:sld xmlns:a="http://schemas.openxmlformats.org/drawingml/2006/main" xmlns:r="http://schemas.openxmlformats.org/officeDocument/2006/relationships" xmlns:p="http://schemas.openxmlformats.org/presentationml/2006/main">
+  <p:cSld>
+    <p:spTree>
+      <p:nvGrpSpPr>
+        <p:cNvPr id="1" name=""/>
+        <p:cNvGrpSpPr/>
+        <p:nvPr/>
+      </p:nvGrpSpPr>
+      <p:grpSpPr>
+        <a:xfrm>
+          <a:off x="0" y="0"/>
+          <a:ext cx="0" cy="0"/>
+          <a:chOff x="0" y="0"/>
+          <a:chExt cx="0" cy="0"/>
+        </a:xfrm>
+      </p:grpSpPr>
+      <p:sp>
+        <p:nvSpPr>
+          <p:cNvPr id="2" name="Titel 1"/>
+          <p:cNvSpPr>
+            <a:spLocks noGrp="1"/>
+          </p:cNvSpPr>
+          <p:nvPr>
+            <p:ph type="title"/>
+          </p:nvPr>
+        </p:nvSpPr>
+        <p:spPr/>
+        <p:txBody>
+          <a:bodyPr/>
+          <a:lstStyle/>
+          <a:p>
+            <a:r>
+              <a:rPr lang="de-DE" dirty="0">
+                <a:solidFill>
+                  <a:srgbClr val="EBEBEB"/>
+                </a:solidFill>
+              </a:rPr>
+              <a:t>Fragen Block B </a:t>
+            </a:r>
+            <a:r>
+              <a:rPr lang="de-DE" sz="2000" i="1" dirty="0">
+                <a:solidFill>
+                  <a:srgbClr val="EBEBEB"/>
+                </a:solidFill>
+              </a:rPr>
+              <a:t>(Prof. C. Müller)</a:t>
+            </a:r>
+            <a:endParaRPr lang="de-DE" dirty="0"/>
+          </a:p>
+        </p:txBody>
+      </p:sp>
+      <p:sp>
+        <p:nvSpPr>
+          <p:cNvPr id="3" name="Inhaltsplatzhalter 2"/>
+          <p:cNvSpPr>
+            <a:spLocks noGrp="1"/>
+          </p:cNvSpPr>
+          <p:nvPr>
+            <p:ph idx="1"/>
+          </p:nvPr>
+        </p:nvSpPr>
+        <p:spPr/>
+        <p:txBody>
+          <a:bodyPr>
+            <a:normAutofit lnSpcReduction="10000"/>
+          </a:bodyPr>
+          <a:lstStyle/>
+          <a:p>
+            <a:r>
+              <a:rPr lang="de-DE" dirty="0" smtClean="0"/>
+              <a:t>Voraussetzung für die Funktionalität der folgenden Lösung</a:t>
+            </a:r>
+          </a:p>
+          <a:p>
+            <a:pPr lvl="1"/>
+            <a:r>
+              <a:rPr lang="de-DE" dirty="0" smtClean="0"/>
+              <a:t>Ist ein funktionierendes Versionskontrollsystem und eine geordnete Projektstruktur</a:t>
+            </a:r>
+          </a:p>
+          <a:p>
+            <a:r>
+              <a:rPr lang="de-DE" dirty="0" smtClean="0"/>
+              <a:t>Es wird GIT als Versionskontrollsystem angenommen weil:</a:t>
+            </a:r>
+          </a:p>
+          <a:p>
+            <a:pPr lvl="1"/>
+            <a:r>
+              <a:rPr lang="de-DE" dirty="0" err="1" smtClean="0"/>
+              <a:t>Git</a:t>
+            </a:r>
+            <a:r>
+              <a:rPr lang="de-DE" dirty="0" smtClean="0"/>
+              <a:t> weit verbreitet ist.</a:t>
+            </a:r>
+          </a:p>
+          <a:p>
+            <a:pPr lvl="1"/>
+            <a:r>
+              <a:rPr lang="de-DE" dirty="0" err="1" smtClean="0"/>
+              <a:t>Git</a:t>
+            </a:r>
+            <a:r>
+              <a:rPr lang="de-DE" dirty="0" smtClean="0"/>
+              <a:t> bereits in der </a:t>
+            </a:r>
+            <a:r>
+              <a:rPr lang="de-DE" dirty="0" err="1" smtClean="0"/>
+              <a:t>Fusee</a:t>
+            </a:r>
+            <a:r>
+              <a:rPr lang="de-DE" dirty="0" smtClean="0"/>
+              <a:t> Entwicklung verwendet wird.</a:t>
+            </a:r>
+          </a:p>
+          <a:p>
+            <a:pPr lvl="1"/>
+            <a:r>
+              <a:rPr lang="de-DE" dirty="0" smtClean="0"/>
+              <a:t>Die Konzepte der Versionskontrollsysteme sich für einfache Anwender wenig unterscheiden.</a:t>
+            </a:r>
+          </a:p>
+          <a:p>
+            <a:r>
+              <a:rPr lang="de-DE" dirty="0" smtClean="0"/>
+              <a:t>Der Prozess des abwechselnden Arbeitens inkludiert</a:t>
+            </a:r>
+          </a:p>
+          <a:p>
+            <a:pPr lvl="1"/>
+            <a:r>
+              <a:rPr lang="de-DE" dirty="0" smtClean="0"/>
+              <a:t>Hinzufügen von Dateien zum Versionskontrollsystem.</a:t>
+            </a:r>
+          </a:p>
+          <a:p>
+            <a:pPr lvl="1"/>
+            <a:r>
+              <a:rPr lang="de-DE" dirty="0" smtClean="0"/>
+              <a:t>Übertragen der Dateien zu anderen Mitarbeitern.</a:t>
+            </a:r>
+          </a:p>
+        </p:txBody>
+      </p:sp>
+    </p:spTree>
+    <p:extLst>
+      <p:ext uri="{BB962C8B-B14F-4D97-AF65-F5344CB8AC3E}">
+        <p14:creationId xmlns:p14="http://schemas.microsoft.com/office/powerpoint/2010/main" val="1663018032"/>
+      </p:ext>
+    </p:extLst>
+  </p:cSld>
+  <p:clrMapOvr>
+    <a:masterClrMapping/>
+  </p:clrMapOvr>
+  <p:timing>
+    <p:tnLst>
+      <p:par>
+        <p:cTn id="1" dur="indefinite" restart="never" nodeType="tmRoot"/>
+      </p:par>
+    </p:tnLst>
+  </p:timing>
+</p:sld>
+</file>
+
+<file path=ppt/slides/slide26.xml><?xml version="1.0" encoding="utf-8"?>
+<p:sld xmlns:a="http://schemas.openxmlformats.org/drawingml/2006/main" xmlns:r="http://schemas.openxmlformats.org/officeDocument/2006/relationships" xmlns:p="http://schemas.openxmlformats.org/presentationml/2006/main">
+  <p:cSld>
+    <p:spTree>
+      <p:nvGrpSpPr>
+        <p:cNvPr id="1" name=""/>
+        <p:cNvGrpSpPr/>
+        <p:nvPr/>
+      </p:nvGrpSpPr>
+      <p:grpSpPr>
+        <a:xfrm>
+          <a:off x="0" y="0"/>
+          <a:ext cx="0" cy="0"/>
+          <a:chOff x="0" y="0"/>
+          <a:chExt cx="0" cy="0"/>
+        </a:xfrm>
+      </p:grpSpPr>
+      <p:sp>
+        <p:nvSpPr>
+          <p:cNvPr id="2" name="Titel 1"/>
+          <p:cNvSpPr>
+            <a:spLocks noGrp="1"/>
+          </p:cNvSpPr>
+          <p:nvPr>
+            <p:ph type="title"/>
+          </p:nvPr>
+        </p:nvSpPr>
+        <p:spPr/>
+        <p:txBody>
+          <a:bodyPr/>
+          <a:lstStyle/>
+          <a:p>
+            <a:r>
+              <a:rPr lang="de-DE" dirty="0">
+                <a:solidFill>
+                  <a:srgbClr val="EBEBEB"/>
+                </a:solidFill>
+              </a:rPr>
+              <a:t>Fragen Block B </a:t>
+            </a:r>
+            <a:r>
+              <a:rPr lang="de-DE" sz="2000" i="1" dirty="0">
+                <a:solidFill>
+                  <a:srgbClr val="EBEBEB"/>
+                </a:solidFill>
+              </a:rPr>
+              <a:t>(Prof. C. Müller)</a:t>
+            </a:r>
+            <a:endParaRPr lang="de-DE" dirty="0"/>
+          </a:p>
+        </p:txBody>
+      </p:sp>
+      <p:sp>
+        <p:nvSpPr>
+          <p:cNvPr id="3" name="Inhaltsplatzhalter 2"/>
+          <p:cNvSpPr>
+            <a:spLocks noGrp="1"/>
+          </p:cNvSpPr>
+          <p:nvPr>
+            <p:ph idx="1"/>
+          </p:nvPr>
+        </p:nvSpPr>
+        <p:spPr/>
+        <p:txBody>
+          <a:bodyPr>
+            <a:normAutofit/>
+          </a:bodyPr>
+          <a:lstStyle/>
+          <a:p>
+            <a:r>
+              <a:rPr lang="de-DE" dirty="0" smtClean="0"/>
+              <a:t>Partial </a:t>
+            </a:r>
+            <a:r>
+              <a:rPr lang="de-DE" dirty="0" err="1" smtClean="0"/>
+              <a:t>Classes</a:t>
+            </a:r>
+            <a:r>
+              <a:rPr lang="de-DE" dirty="0" smtClean="0"/>
+              <a:t> verhindern Probleme durch Konflikte</a:t>
+            </a:r>
+          </a:p>
+          <a:p>
+            <a:pPr lvl="1"/>
+            <a:r>
+              <a:rPr lang="de-DE" dirty="0" smtClean="0"/>
+              <a:t>Der Programmierer bearbeitet nur  die manuelle Datei.</a:t>
+            </a:r>
+          </a:p>
+          <a:p>
+            <a:pPr lvl="1"/>
+            <a:r>
+              <a:rPr lang="de-DE" dirty="0" smtClean="0"/>
+              <a:t>Das Tool greift nur auf den generierten Teil der Klasse zu.</a:t>
+            </a:r>
+          </a:p>
+          <a:p>
+            <a:r>
+              <a:rPr lang="de-DE" dirty="0" smtClean="0"/>
+              <a:t>Problematik ergibt sich nur in der Handhabung der Projektdateien</a:t>
+            </a:r>
+          </a:p>
+          <a:p>
+            <a:pPr lvl="1"/>
+            <a:r>
+              <a:rPr lang="de-DE" dirty="0" smtClean="0"/>
+              <a:t>Designer muss seine Dateien erst zur Verfügung stellen.</a:t>
+            </a:r>
+          </a:p>
+          <a:p>
+            <a:pPr lvl="1"/>
+            <a:r>
+              <a:rPr lang="de-DE" dirty="0" smtClean="0"/>
+              <a:t>Tool muss korrekte Pfade übergeben.</a:t>
+            </a:r>
+          </a:p>
+        </p:txBody>
+      </p:sp>
+    </p:spTree>
+    <p:extLst>
+      <p:ext uri="{BB962C8B-B14F-4D97-AF65-F5344CB8AC3E}">
+        <p14:creationId xmlns:p14="http://schemas.microsoft.com/office/powerpoint/2010/main" val="1938138661"/>
+      </p:ext>
+    </p:extLst>
+  </p:cSld>
+  <p:clrMapOvr>
+    <a:masterClrMapping/>
+  </p:clrMapOvr>
+  <p:timing>
+    <p:tnLst>
+      <p:par>
+        <p:cTn id="1" dur="indefinite" restart="never" nodeType="tmRoot"/>
+      </p:par>
+    </p:tnLst>
+  </p:timing>
+</p:sld>
+</file>
+
+<file path=ppt/slides/slide27.xml><?xml version="1.0" encoding="utf-8"?>
+<p:sld xmlns:a="http://schemas.openxmlformats.org/drawingml/2006/main" xmlns:r="http://schemas.openxmlformats.org/officeDocument/2006/relationships" xmlns:p="http://schemas.openxmlformats.org/presentationml/2006/main">
+  <p:cSld>
+    <p:spTree>
+      <p:nvGrpSpPr>
+        <p:cNvPr id="1" name=""/>
+        <p:cNvGrpSpPr/>
+        <p:nvPr/>
+      </p:nvGrpSpPr>
+      <p:grpSpPr>
+        <a:xfrm>
+          <a:off x="0" y="0"/>
+          <a:ext cx="0" cy="0"/>
+          <a:chOff x="0" y="0"/>
+          <a:chExt cx="0" cy="0"/>
+        </a:xfrm>
+      </p:grpSpPr>
+      <p:sp>
+        <p:nvSpPr>
+          <p:cNvPr id="2" name="Titel 1"/>
+          <p:cNvSpPr>
+            <a:spLocks noGrp="1"/>
+          </p:cNvSpPr>
+          <p:nvPr>
+            <p:ph type="title"/>
+          </p:nvPr>
+        </p:nvSpPr>
+        <p:spPr/>
+        <p:txBody>
+          <a:bodyPr/>
+          <a:lstStyle/>
+          <a:p>
+            <a:r>
+              <a:rPr lang="de-DE" dirty="0">
+                <a:solidFill>
+                  <a:srgbClr val="EBEBEB"/>
+                </a:solidFill>
+              </a:rPr>
+              <a:t>Fragen Block B </a:t>
+            </a:r>
+            <a:r>
+              <a:rPr lang="de-DE" sz="2000" i="1" dirty="0">
+                <a:solidFill>
+                  <a:srgbClr val="EBEBEB"/>
+                </a:solidFill>
+              </a:rPr>
+              <a:t>(Prof. C. Müller)</a:t>
+            </a:r>
+            <a:endParaRPr lang="de-DE" dirty="0"/>
+          </a:p>
+        </p:txBody>
+      </p:sp>
+      <p:sp>
+        <p:nvSpPr>
+          <p:cNvPr id="3" name="Inhaltsplatzhalter 2"/>
+          <p:cNvSpPr>
+            <a:spLocks noGrp="1"/>
+          </p:cNvSpPr>
+          <p:nvPr>
+            <p:ph idx="1"/>
+          </p:nvPr>
+        </p:nvSpPr>
+        <p:spPr/>
+        <p:txBody>
+          <a:bodyPr/>
+          <a:lstStyle/>
+          <a:p>
+            <a:r>
+              <a:rPr lang="de-DE" dirty="0"/>
+              <a:t>Sollten sich Daten ändern so</a:t>
+            </a:r>
+          </a:p>
+          <a:p>
+            <a:pPr lvl="1"/>
+            <a:r>
+              <a:rPr lang="de-DE" dirty="0"/>
+              <a:t>Kann das </a:t>
+            </a:r>
+            <a:r>
+              <a:rPr lang="de-DE" dirty="0" err="1"/>
+              <a:t>FuseeAT</a:t>
+            </a:r>
+            <a:r>
+              <a:rPr lang="de-DE" dirty="0"/>
+              <a:t> diese im generierten Teil updaten</a:t>
+            </a:r>
+          </a:p>
+          <a:p>
+            <a:pPr lvl="1"/>
+            <a:r>
+              <a:rPr lang="de-DE" dirty="0"/>
+              <a:t>Kann der nächste Commit diese Dateien dem Programmierer zur Verfügung stellen.</a:t>
+            </a:r>
+          </a:p>
+          <a:p>
+            <a:r>
+              <a:rPr lang="de-DE" dirty="0" smtClean="0"/>
+              <a:t>XML</a:t>
+            </a:r>
+            <a:r>
+              <a:rPr lang="de-DE" baseline="0" dirty="0" smtClean="0"/>
+              <a:t> </a:t>
+            </a:r>
+            <a:r>
+              <a:rPr lang="de-DE" dirty="0" smtClean="0"/>
+              <a:t>Datencontainer unterstützen Programmierer</a:t>
+            </a:r>
+          </a:p>
+          <a:p>
+            <a:pPr lvl="1"/>
+            <a:r>
+              <a:rPr lang="de-DE" dirty="0" smtClean="0"/>
+              <a:t>Werden von </a:t>
+            </a:r>
+            <a:r>
+              <a:rPr lang="de-DE" dirty="0" err="1" smtClean="0"/>
+              <a:t>FuseeAT</a:t>
+            </a:r>
+            <a:r>
+              <a:rPr lang="de-DE" dirty="0" smtClean="0"/>
+              <a:t> aktualisiert.</a:t>
+            </a:r>
+          </a:p>
+          <a:p>
+            <a:pPr lvl="1"/>
+            <a:r>
+              <a:rPr lang="de-DE" dirty="0" smtClean="0"/>
+              <a:t>Können zur Not vom Programmierer angepasst werden.</a:t>
+            </a:r>
+          </a:p>
+          <a:p>
+            <a:pPr lvl="1"/>
+            <a:r>
+              <a:rPr lang="de-DE" dirty="0" smtClean="0"/>
+              <a:t>Updaten gleichzeitig indirekt den generierten Code beim nächsten verwenden des Editors.</a:t>
+            </a:r>
+            <a:endParaRPr lang="de-DE" dirty="0"/>
+          </a:p>
+        </p:txBody>
+      </p:sp>
+    </p:spTree>
+    <p:extLst>
+      <p:ext uri="{BB962C8B-B14F-4D97-AF65-F5344CB8AC3E}">
+        <p14:creationId xmlns:p14="http://schemas.microsoft.com/office/powerpoint/2010/main" val="4167901931"/>
+      </p:ext>
+    </p:extLst>
+  </p:cSld>
+  <p:clrMapOvr>
+    <a:masterClrMapping/>
+  </p:clrMapOvr>
+  <p:timing>
+    <p:tnLst>
+      <p:par>
+        <p:cTn id="1" dur="indefinite" restart="never" nodeType="tmRoot"/>
+      </p:par>
+    </p:tnLst>
+  </p:timing>
+</p:sld>
+</file>
+
+<file path=ppt/slides/slide28.xml><?xml version="1.0" encoding="utf-8"?>
+<p:sld xmlns:a="http://schemas.openxmlformats.org/drawingml/2006/main" xmlns:r="http://schemas.openxmlformats.org/officeDocument/2006/relationships" xmlns:p="http://schemas.openxmlformats.org/presentationml/2006/main">
+  <p:cSld>
+    <p:spTree>
+      <p:nvGrpSpPr>
+        <p:cNvPr id="1" name=""/>
+        <p:cNvGrpSpPr/>
+        <p:nvPr/>
+      </p:nvGrpSpPr>
+      <p:grpSpPr>
+        <a:xfrm>
+          <a:off x="0" y="0"/>
+          <a:ext cx="0" cy="0"/>
+          <a:chOff x="0" y="0"/>
+          <a:chExt cx="0" cy="0"/>
+        </a:xfrm>
+      </p:grpSpPr>
+      <p:sp>
+        <p:nvSpPr>
+          <p:cNvPr id="2" name="Titel 1"/>
+          <p:cNvSpPr>
+            <a:spLocks noGrp="1"/>
+          </p:cNvSpPr>
+          <p:nvPr>
+            <p:ph type="title"/>
+          </p:nvPr>
+        </p:nvSpPr>
+        <p:spPr/>
+        <p:txBody>
+          <a:bodyPr/>
+          <a:lstStyle/>
+          <a:p>
+            <a:r>
+              <a:rPr lang="de-DE" dirty="0" smtClean="0"/>
+              <a:t>Abschluss</a:t>
+            </a:r>
+            <a:endParaRPr lang="de-DE" dirty="0"/>
+          </a:p>
+        </p:txBody>
+      </p:sp>
+      <p:sp>
+        <p:nvSpPr>
+          <p:cNvPr id="3" name="Inhaltsplatzhalter 2"/>
+          <p:cNvSpPr>
+            <a:spLocks noGrp="1"/>
+          </p:cNvSpPr>
+          <p:nvPr>
+            <p:ph idx="1"/>
+          </p:nvPr>
+        </p:nvSpPr>
+        <p:spPr/>
+        <p:txBody>
+          <a:bodyPr/>
+          <a:lstStyle/>
+          <a:p>
+            <a:r>
+              <a:rPr lang="de-DE" dirty="0" smtClean="0"/>
+              <a:t>Fragen und Diskussion des Auditoriums.</a:t>
+            </a:r>
+          </a:p>
+        </p:txBody>
+      </p:sp>
+    </p:spTree>
+    <p:extLst>
+      <p:ext uri="{BB962C8B-B14F-4D97-AF65-F5344CB8AC3E}">
+        <p14:creationId xmlns:p14="http://schemas.microsoft.com/office/powerpoint/2010/main" val="1620754771"/>
+      </p:ext>
+    </p:extLst>
+  </p:cSld>
+  <p:clrMapOvr>
+    <a:masterClrMapping/>
+  </p:clrMapOvr>
+  <p:timing>
+    <p:tnLst>
+      <p:par>
+        <p:cTn id="1" dur="indefinite" restart="never" nodeType="tmRoot"/>
+      </p:par>
+    </p:tnLst>
+  </p:timing>
+</p:sld>
+</file>
+
+<file path=ppt/slides/slide29.xml><?xml version="1.0" encoding="utf-8"?>
+<p:sld xmlns:a="http://schemas.openxmlformats.org/drawingml/2006/main" xmlns:r="http://schemas.openxmlformats.org/officeDocument/2006/relationships" xmlns:p="http://schemas.openxmlformats.org/presentationml/2006/main">
+  <p:cSld>
+    <p:spTree>
+      <p:nvGrpSpPr>
+        <p:cNvPr id="1" name=""/>
+        <p:cNvGrpSpPr/>
+        <p:nvPr/>
+      </p:nvGrpSpPr>
+      <p:grpSpPr>
+        <a:xfrm>
+          <a:off x="0" y="0"/>
+          <a:ext cx="0" cy="0"/>
+          <a:chOff x="0" y="0"/>
+          <a:chExt cx="0" cy="0"/>
+        </a:xfrm>
+      </p:grpSpPr>
+      <p:sp>
+        <p:nvSpPr>
+          <p:cNvPr id="2" name="Titel 1"/>
+          <p:cNvSpPr>
+            <a:spLocks noGrp="1"/>
+          </p:cNvSpPr>
+          <p:nvPr>
+            <p:ph type="title"/>
+          </p:nvPr>
+        </p:nvSpPr>
+        <p:spPr/>
+        <p:txBody>
+          <a:bodyPr/>
+          <a:lstStyle/>
+          <a:p>
+            <a:r>
+              <a:rPr lang="de-DE" dirty="0" smtClean="0"/>
+              <a:t>Verabschiedung und Dank</a:t>
+            </a:r>
+            <a:endParaRPr lang="de-DE" dirty="0"/>
+          </a:p>
+        </p:txBody>
+      </p:sp>
+      <p:sp>
+        <p:nvSpPr>
+          <p:cNvPr id="3" name="Inhaltsplatzhalter 2"/>
+          <p:cNvSpPr>
+            <a:spLocks noGrp="1"/>
+          </p:cNvSpPr>
+          <p:nvPr>
+            <p:ph idx="1"/>
+          </p:nvPr>
+        </p:nvSpPr>
+        <p:spPr/>
+        <p:txBody>
+          <a:bodyPr/>
+          <a:lstStyle/>
+          <a:p>
+            <a:r>
+              <a:rPr lang="de-DE" dirty="0" smtClean="0"/>
+              <a:t>Vielen</a:t>
+            </a:r>
+            <a:r>
+              <a:rPr lang="de-DE" baseline="0" dirty="0" smtClean="0"/>
+              <a:t> Dank an die Betreuer der Arbeit für ihre Unterstützung.</a:t>
+            </a:r>
+          </a:p>
+          <a:p>
+            <a:r>
+              <a:rPr lang="de-DE" baseline="0" dirty="0" smtClean="0"/>
+              <a:t>Vielen Dank an die Fakultät Digitale Medien für die Unterstützung in meiner Tätigkeit als Akademischer Mitarbeiter während des Bearbeitungszeitraums.</a:t>
+            </a:r>
+          </a:p>
+        </p:txBody>
+      </p:sp>
+    </p:spTree>
+    <p:extLst>
+      <p:ext uri="{BB962C8B-B14F-4D97-AF65-F5344CB8AC3E}">
+        <p14:creationId xmlns:p14="http://schemas.microsoft.com/office/powerpoint/2010/main" val="1386344869"/>
       </p:ext>
     </p:extLst>
   </p:cSld>

</xml_diff>